<commit_message>
draft end version control
</commit_message>
<xml_diff>
--- a/StyleStuff/figures.pptx
+++ b/StyleStuff/figures.pptx
@@ -323,7 +323,7 @@
           <a:p>
             <a:fld id="{54F4720F-D6E7-473E-8843-300157F93B80}" type="datetimeFigureOut">
               <a:rPr lang="nl-NL" smtClean="0"/>
-              <a:t>24-7-2017</a:t>
+              <a:t>25-7-2017</a:t>
             </a:fld>
             <a:endParaRPr lang="nl-NL"/>
           </a:p>
@@ -493,7 +493,7 @@
           <a:p>
             <a:fld id="{54F4720F-D6E7-473E-8843-300157F93B80}" type="datetimeFigureOut">
               <a:rPr lang="nl-NL" smtClean="0"/>
-              <a:t>24-7-2017</a:t>
+              <a:t>25-7-2017</a:t>
             </a:fld>
             <a:endParaRPr lang="nl-NL"/>
           </a:p>
@@ -673,7 +673,7 @@
           <a:p>
             <a:fld id="{54F4720F-D6E7-473E-8843-300157F93B80}" type="datetimeFigureOut">
               <a:rPr lang="nl-NL" smtClean="0"/>
-              <a:t>24-7-2017</a:t>
+              <a:t>25-7-2017</a:t>
             </a:fld>
             <a:endParaRPr lang="nl-NL"/>
           </a:p>
@@ -843,7 +843,7 @@
           <a:p>
             <a:fld id="{54F4720F-D6E7-473E-8843-300157F93B80}" type="datetimeFigureOut">
               <a:rPr lang="nl-NL" smtClean="0"/>
-              <a:t>24-7-2017</a:t>
+              <a:t>25-7-2017</a:t>
             </a:fld>
             <a:endParaRPr lang="nl-NL"/>
           </a:p>
@@ -1089,7 +1089,7 @@
           <a:p>
             <a:fld id="{54F4720F-D6E7-473E-8843-300157F93B80}" type="datetimeFigureOut">
               <a:rPr lang="nl-NL" smtClean="0"/>
-              <a:t>24-7-2017</a:t>
+              <a:t>25-7-2017</a:t>
             </a:fld>
             <a:endParaRPr lang="nl-NL"/>
           </a:p>
@@ -1377,7 +1377,7 @@
           <a:p>
             <a:fld id="{54F4720F-D6E7-473E-8843-300157F93B80}" type="datetimeFigureOut">
               <a:rPr lang="nl-NL" smtClean="0"/>
-              <a:t>24-7-2017</a:t>
+              <a:t>25-7-2017</a:t>
             </a:fld>
             <a:endParaRPr lang="nl-NL"/>
           </a:p>
@@ -1799,7 +1799,7 @@
           <a:p>
             <a:fld id="{54F4720F-D6E7-473E-8843-300157F93B80}" type="datetimeFigureOut">
               <a:rPr lang="nl-NL" smtClean="0"/>
-              <a:t>24-7-2017</a:t>
+              <a:t>25-7-2017</a:t>
             </a:fld>
             <a:endParaRPr lang="nl-NL"/>
           </a:p>
@@ -1917,7 +1917,7 @@
           <a:p>
             <a:fld id="{54F4720F-D6E7-473E-8843-300157F93B80}" type="datetimeFigureOut">
               <a:rPr lang="nl-NL" smtClean="0"/>
-              <a:t>24-7-2017</a:t>
+              <a:t>25-7-2017</a:t>
             </a:fld>
             <a:endParaRPr lang="nl-NL"/>
           </a:p>
@@ -2012,7 +2012,7 @@
           <a:p>
             <a:fld id="{54F4720F-D6E7-473E-8843-300157F93B80}" type="datetimeFigureOut">
               <a:rPr lang="nl-NL" smtClean="0"/>
-              <a:t>24-7-2017</a:t>
+              <a:t>25-7-2017</a:t>
             </a:fld>
             <a:endParaRPr lang="nl-NL"/>
           </a:p>
@@ -2289,7 +2289,7 @@
           <a:p>
             <a:fld id="{54F4720F-D6E7-473E-8843-300157F93B80}" type="datetimeFigureOut">
               <a:rPr lang="nl-NL" smtClean="0"/>
-              <a:t>24-7-2017</a:t>
+              <a:t>25-7-2017</a:t>
             </a:fld>
             <a:endParaRPr lang="nl-NL"/>
           </a:p>
@@ -2542,7 +2542,7 @@
           <a:p>
             <a:fld id="{54F4720F-D6E7-473E-8843-300157F93B80}" type="datetimeFigureOut">
               <a:rPr lang="nl-NL" smtClean="0"/>
-              <a:t>24-7-2017</a:t>
+              <a:t>25-7-2017</a:t>
             </a:fld>
             <a:endParaRPr lang="nl-NL"/>
           </a:p>
@@ -2755,7 +2755,7 @@
           <a:p>
             <a:fld id="{54F4720F-D6E7-473E-8843-300157F93B80}" type="datetimeFigureOut">
               <a:rPr lang="nl-NL" smtClean="0"/>
-              <a:t>24-7-2017</a:t>
+              <a:t>25-7-2017</a:t>
             </a:fld>
             <a:endParaRPr lang="nl-NL"/>
           </a:p>
@@ -8728,7 +8728,7 @@
       </p:pic>
       <p:pic>
         <p:nvPicPr>
-          <p:cNvPr id="4" name="Picture 3"/>
+          <p:cNvPr id="7" name="Picture 6"/>
           <p:cNvPicPr>
             <a:picLocks noChangeAspect="1"/>
           </p:cNvPicPr>
@@ -8759,8 +8759,8 @@
         </p:blipFill>
         <p:spPr>
           <a:xfrm>
-            <a:off x="4597364" y="1868190"/>
-            <a:ext cx="1107919" cy="1073551"/>
+            <a:off x="5422041" y="1516127"/>
+            <a:ext cx="409534" cy="580647"/>
           </a:xfrm>
           <a:prstGeom prst="rect">
             <a:avLst/>
@@ -8786,13 +8786,6 @@
         </p:nvPicPr>
         <p:blipFill>
           <a:blip r:embed="rId12">
-            <a:duotone>
-              <a:schemeClr val="bg2">
-                <a:shade val="45000"/>
-                <a:satMod val="135000"/>
-              </a:schemeClr>
-              <a:prstClr val="white"/>
-            </a:duotone>
             <a:extLst>
               <a:ext uri="{28A0092B-C50C-407E-A947-70E740481C1C}">
                 <a14:useLocalDpi xmlns:a14="http://schemas.microsoft.com/office/drawing/2010/main" val="0"/>
@@ -8805,7 +8798,7 @@
         </p:blipFill>
         <p:spPr>
           <a:xfrm>
-            <a:off x="414102" y="2008050"/>
+            <a:off x="451493" y="1420657"/>
             <a:ext cx="2196089" cy="1276934"/>
           </a:xfrm>
           <a:prstGeom prst="rect">
@@ -8820,34 +8813,30 @@
       </p:pic>
       <p:sp>
         <p:nvSpPr>
-          <p:cNvPr id="20" name="Freeform 19"/>
+          <p:cNvPr id="16" name="Freeform 15"/>
           <p:cNvSpPr/>
           <p:nvPr/>
         </p:nvSpPr>
         <p:spPr>
-          <a:xfrm rot="19973883">
-            <a:off x="1342396" y="190857"/>
-            <a:ext cx="6276395" cy="3910513"/>
+          <a:xfrm>
+            <a:off x="2687690" y="1780773"/>
+            <a:ext cx="5268686" cy="1151874"/>
           </a:xfrm>
           <a:custGeom>
             <a:avLst/>
             <a:gdLst>
-              <a:gd name="connsiteX0" fmla="*/ 0 w 5874328"/>
-              <a:gd name="connsiteY0" fmla="*/ 665444 h 2618934"/>
-              <a:gd name="connsiteX1" fmla="*/ 1468582 w 5874328"/>
-              <a:gd name="connsiteY1" fmla="*/ 14280 h 2618934"/>
-              <a:gd name="connsiteX2" fmla="*/ 1399310 w 5874328"/>
-              <a:gd name="connsiteY2" fmla="*/ 1219625 h 2618934"/>
-              <a:gd name="connsiteX3" fmla="*/ 3491346 w 5874328"/>
-              <a:gd name="connsiteY3" fmla="*/ 1081080 h 2618934"/>
-              <a:gd name="connsiteX4" fmla="*/ 4073237 w 5874328"/>
-              <a:gd name="connsiteY4" fmla="*/ 1787662 h 2618934"/>
-              <a:gd name="connsiteX5" fmla="*/ 5084619 w 5874328"/>
-              <a:gd name="connsiteY5" fmla="*/ 2078607 h 2618934"/>
-              <a:gd name="connsiteX6" fmla="*/ 5763491 w 5874328"/>
-              <a:gd name="connsiteY6" fmla="*/ 2244862 h 2618934"/>
-              <a:gd name="connsiteX7" fmla="*/ 5874328 w 5874328"/>
-              <a:gd name="connsiteY7" fmla="*/ 2618934 h 2618934"/>
+              <a:gd name="connsiteX0" fmla="*/ 0 w 5268686"/>
+              <a:gd name="connsiteY0" fmla="*/ 251227 h 1151874"/>
+              <a:gd name="connsiteX1" fmla="*/ 1640114 w 5268686"/>
+              <a:gd name="connsiteY1" fmla="*/ 48027 h 1151874"/>
+              <a:gd name="connsiteX2" fmla="*/ 1901371 w 5268686"/>
+              <a:gd name="connsiteY2" fmla="*/ 1049513 h 1151874"/>
+              <a:gd name="connsiteX3" fmla="*/ 2975429 w 5268686"/>
+              <a:gd name="connsiteY3" fmla="*/ 338313 h 1151874"/>
+              <a:gd name="connsiteX4" fmla="*/ 4034971 w 5268686"/>
+              <a:gd name="connsiteY4" fmla="*/ 1151113 h 1151874"/>
+              <a:gd name="connsiteX5" fmla="*/ 5268686 w 5268686"/>
+              <a:gd name="connsiteY5" fmla="*/ 497970 h 1151874"/>
             </a:gdLst>
             <a:ahLst/>
             <a:cxnLst>
@@ -8869,53 +8858,37 @@
               <a:cxn ang="0">
                 <a:pos x="connsiteX5" y="connsiteY5"/>
               </a:cxn>
-              <a:cxn ang="0">
-                <a:pos x="connsiteX6" y="connsiteY6"/>
-              </a:cxn>
-              <a:cxn ang="0">
-                <a:pos x="connsiteX7" y="connsiteY7"/>
-              </a:cxn>
             </a:cxnLst>
             <a:rect l="l" t="t" r="r" b="b"/>
             <a:pathLst>
-              <a:path w="5874328" h="2618934">
+              <a:path w="5268686" h="1151874">
                 <a:moveTo>
-                  <a:pt x="0" y="665444"/>
+                  <a:pt x="0" y="251227"/>
                 </a:moveTo>
                 <a:cubicBezTo>
-                  <a:pt x="617682" y="293680"/>
-                  <a:pt x="1235364" y="-78084"/>
-                  <a:pt x="1468582" y="14280"/>
+                  <a:pt x="661609" y="83103"/>
+                  <a:pt x="1323219" y="-85021"/>
+                  <a:pt x="1640114" y="48027"/>
                 </a:cubicBezTo>
                 <a:cubicBezTo>
-                  <a:pt x="1701800" y="106644"/>
-                  <a:pt x="1062183" y="1041825"/>
-                  <a:pt x="1399310" y="1219625"/>
+                  <a:pt x="1957009" y="181075"/>
+                  <a:pt x="1678819" y="1001132"/>
+                  <a:pt x="1901371" y="1049513"/>
                 </a:cubicBezTo>
                 <a:cubicBezTo>
-                  <a:pt x="1736437" y="1397425"/>
-                  <a:pt x="3045692" y="986407"/>
-                  <a:pt x="3491346" y="1081080"/>
+                  <a:pt x="2123923" y="1097894"/>
+                  <a:pt x="2619829" y="321380"/>
+                  <a:pt x="2975429" y="338313"/>
                 </a:cubicBezTo>
                 <a:cubicBezTo>
-                  <a:pt x="3937000" y="1175753"/>
-                  <a:pt x="3807692" y="1621408"/>
-                  <a:pt x="4073237" y="1787662"/>
+                  <a:pt x="3331029" y="355246"/>
+                  <a:pt x="3652762" y="1124504"/>
+                  <a:pt x="4034971" y="1151113"/>
                 </a:cubicBezTo>
                 <a:cubicBezTo>
-                  <a:pt x="4338782" y="1953916"/>
-                  <a:pt x="4802910" y="2002407"/>
-                  <a:pt x="5084619" y="2078607"/>
-                </a:cubicBezTo>
-                <a:cubicBezTo>
-                  <a:pt x="5366328" y="2154807"/>
-                  <a:pt x="5631873" y="2154807"/>
-                  <a:pt x="5763491" y="2244862"/>
-                </a:cubicBezTo>
-                <a:cubicBezTo>
-                  <a:pt x="5895109" y="2334917"/>
-                  <a:pt x="5832764" y="2605080"/>
-                  <a:pt x="5874328" y="2618934"/>
+                  <a:pt x="4417180" y="1177722"/>
+                  <a:pt x="5268686" y="497970"/>
+                  <a:pt x="5268686" y="497970"/>
                 </a:cubicBezTo>
               </a:path>
             </a:pathLst>
@@ -8957,7 +8930,7 @@
       </p:sp>
       <p:pic>
         <p:nvPicPr>
-          <p:cNvPr id="5" name="Picture 4 2"/>
+          <p:cNvPr id="2" name="Picture 1"/>
           <p:cNvPicPr>
             <a:picLocks noChangeAspect="1"/>
           </p:cNvPicPr>
@@ -8988,8 +8961,8 @@
         </p:blipFill>
         <p:spPr>
           <a:xfrm>
-            <a:off x="3308728" y="3196340"/>
-            <a:ext cx="710325" cy="900008"/>
+            <a:off x="3619056" y="3866584"/>
+            <a:ext cx="408437" cy="822421"/>
           </a:xfrm>
           <a:prstGeom prst="rect">
             <a:avLst/>
@@ -9001,6 +8974,45 @@
           </a:solidFill>
         </p:spPr>
       </p:pic>
+      <p:pic>
+        <p:nvPicPr>
+          <p:cNvPr id="33" name="Picture 32"/>
+          <p:cNvPicPr>
+            <a:picLocks noChangeAspect="1"/>
+          </p:cNvPicPr>
+          <p:nvPr>
+            <p:custDataLst>
+              <p:tags r:id="rId4"/>
+            </p:custDataLst>
+          </p:nvPr>
+        </p:nvPicPr>
+        <p:blipFill>
+          <a:blip r:embed="rId14">
+            <a:extLst>
+              <a:ext uri="{28A0092B-C50C-407E-A947-70E740481C1C}">
+                <a14:useLocalDpi xmlns:a14="http://schemas.microsoft.com/office/drawing/2010/main" val="0"/>
+              </a:ext>
+            </a:extLst>
+          </a:blip>
+          <a:stretch>
+            <a:fillRect/>
+          </a:stretch>
+        </p:blipFill>
+        <p:spPr>
+          <a:xfrm>
+            <a:off x="5329867" y="3356992"/>
+            <a:ext cx="2266469" cy="1042774"/>
+          </a:xfrm>
+          <a:prstGeom prst="rect">
+            <a:avLst/>
+          </a:prstGeom>
+          <a:solidFill>
+            <a:schemeClr val="bg1">
+              <a:alpha val="65000"/>
+            </a:schemeClr>
+          </a:solidFill>
+        </p:spPr>
+      </p:pic>
       <p:sp>
         <p:nvSpPr>
           <p:cNvPr id="10" name="Oval 9"/>
@@ -9009,7 +9021,7 @@
         </p:nvSpPr>
         <p:spPr>
           <a:xfrm>
-            <a:off x="5668072" y="2074834"/>
+            <a:off x="5588548" y="2039587"/>
             <a:ext cx="243027" cy="270725"/>
           </a:xfrm>
           <a:prstGeom prst="ellipse">
@@ -9047,12 +9059,12 @@
           </p:cNvPicPr>
           <p:nvPr>
             <p:custDataLst>
-              <p:tags r:id="rId4"/>
+              <p:tags r:id="rId5"/>
             </p:custDataLst>
           </p:nvPr>
         </p:nvPicPr>
         <p:blipFill>
-          <a:blip r:embed="rId14">
+          <a:blip r:embed="rId15">
             <a:extLst>
               <a:ext uri="{28A0092B-C50C-407E-A947-70E740481C1C}">
                 <a14:useLocalDpi xmlns:a14="http://schemas.microsoft.com/office/drawing/2010/main" val="0"/>
@@ -9065,7 +9077,7 @@
         </p:blipFill>
         <p:spPr>
           <a:xfrm>
-            <a:off x="7014080" y="5641315"/>
+            <a:off x="6921842" y="5638578"/>
             <a:ext cx="2014033" cy="1008748"/>
           </a:xfrm>
           <a:prstGeom prst="rect">
@@ -9073,82 +9085,32 @@
           </a:prstGeom>
         </p:spPr>
       </p:pic>
-      <p:pic>
-        <p:nvPicPr>
-          <p:cNvPr id="17" name="Picture 16"/>
-          <p:cNvPicPr>
-            <a:picLocks noChangeAspect="1"/>
-          </p:cNvPicPr>
-          <p:nvPr>
-            <p:custDataLst>
-              <p:tags r:id="rId5"/>
-            </p:custDataLst>
-          </p:nvPr>
-        </p:nvPicPr>
-        <p:blipFill>
-          <a:blip r:embed="rId15">
-            <a:duotone>
-              <a:schemeClr val="bg2">
-                <a:shade val="45000"/>
-                <a:satMod val="135000"/>
-              </a:schemeClr>
-              <a:prstClr val="white"/>
-            </a:duotone>
-            <a:extLst>
-              <a:ext uri="{28A0092B-C50C-407E-A947-70E740481C1C}">
-                <a14:useLocalDpi xmlns:a14="http://schemas.microsoft.com/office/drawing/2010/main" val="0"/>
-              </a:ext>
-            </a:extLst>
-          </a:blip>
-          <a:stretch>
-            <a:fillRect/>
-          </a:stretch>
-        </p:blipFill>
-        <p:spPr>
-          <a:xfrm>
-            <a:off x="539552" y="4171535"/>
-            <a:ext cx="1744243" cy="1271806"/>
-          </a:xfrm>
-          <a:prstGeom prst="rect">
-            <a:avLst/>
-          </a:prstGeom>
-          <a:solidFill>
-            <a:schemeClr val="bg1">
-              <a:alpha val="65000"/>
-            </a:schemeClr>
-          </a:solidFill>
-        </p:spPr>
-      </p:pic>
       <p:sp>
         <p:nvSpPr>
-          <p:cNvPr id="19" name="Freeform 18"/>
+          <p:cNvPr id="30" name="Freeform 29"/>
           <p:cNvSpPr/>
           <p:nvPr/>
         </p:nvSpPr>
         <p:spPr>
-          <a:xfrm rot="20293109">
-            <a:off x="1433845" y="2842900"/>
-            <a:ext cx="4425628" cy="3482573"/>
+          <a:xfrm>
+            <a:off x="2195736" y="3915547"/>
+            <a:ext cx="5167085" cy="1457669"/>
           </a:xfrm>
           <a:custGeom>
             <a:avLst/>
             <a:gdLst>
-              <a:gd name="connsiteX0" fmla="*/ 0 w 5874328"/>
-              <a:gd name="connsiteY0" fmla="*/ 665444 h 2618934"/>
-              <a:gd name="connsiteX1" fmla="*/ 1468582 w 5874328"/>
-              <a:gd name="connsiteY1" fmla="*/ 14280 h 2618934"/>
-              <a:gd name="connsiteX2" fmla="*/ 1399310 w 5874328"/>
-              <a:gd name="connsiteY2" fmla="*/ 1219625 h 2618934"/>
-              <a:gd name="connsiteX3" fmla="*/ 3491346 w 5874328"/>
-              <a:gd name="connsiteY3" fmla="*/ 1081080 h 2618934"/>
-              <a:gd name="connsiteX4" fmla="*/ 4073237 w 5874328"/>
-              <a:gd name="connsiteY4" fmla="*/ 1787662 h 2618934"/>
-              <a:gd name="connsiteX5" fmla="*/ 5084619 w 5874328"/>
-              <a:gd name="connsiteY5" fmla="*/ 2078607 h 2618934"/>
-              <a:gd name="connsiteX6" fmla="*/ 5763491 w 5874328"/>
-              <a:gd name="connsiteY6" fmla="*/ 2244862 h 2618934"/>
-              <a:gd name="connsiteX7" fmla="*/ 5874328 w 5874328"/>
-              <a:gd name="connsiteY7" fmla="*/ 2618934 h 2618934"/>
+              <a:gd name="connsiteX0" fmla="*/ 0 w 5167085"/>
+              <a:gd name="connsiteY0" fmla="*/ 557783 h 1457669"/>
+              <a:gd name="connsiteX1" fmla="*/ 1277257 w 5167085"/>
+              <a:gd name="connsiteY1" fmla="*/ 20754 h 1457669"/>
+              <a:gd name="connsiteX2" fmla="*/ 1436914 w 5167085"/>
+              <a:gd name="connsiteY2" fmla="*/ 1196411 h 1457669"/>
+              <a:gd name="connsiteX3" fmla="*/ 3526971 w 5167085"/>
+              <a:gd name="connsiteY3" fmla="*/ 717440 h 1457669"/>
+              <a:gd name="connsiteX4" fmla="*/ 4659085 w 5167085"/>
+              <a:gd name="connsiteY4" fmla="*/ 630354 h 1457669"/>
+              <a:gd name="connsiteX5" fmla="*/ 5167085 w 5167085"/>
+              <a:gd name="connsiteY5" fmla="*/ 1457669 h 1457669"/>
             </a:gdLst>
             <a:ahLst/>
             <a:cxnLst>
@@ -9170,53 +9132,37 @@
               <a:cxn ang="0">
                 <a:pos x="connsiteX5" y="connsiteY5"/>
               </a:cxn>
-              <a:cxn ang="0">
-                <a:pos x="connsiteX6" y="connsiteY6"/>
-              </a:cxn>
-              <a:cxn ang="0">
-                <a:pos x="connsiteX7" y="connsiteY7"/>
-              </a:cxn>
             </a:cxnLst>
             <a:rect l="l" t="t" r="r" b="b"/>
             <a:pathLst>
-              <a:path w="5874328" h="2618934">
+              <a:path w="5167085" h="1457669">
                 <a:moveTo>
-                  <a:pt x="0" y="665444"/>
+                  <a:pt x="0" y="557783"/>
                 </a:moveTo>
                 <a:cubicBezTo>
-                  <a:pt x="617682" y="293680"/>
-                  <a:pt x="1235364" y="-78084"/>
-                  <a:pt x="1468582" y="14280"/>
+                  <a:pt x="518885" y="236049"/>
+                  <a:pt x="1037771" y="-85684"/>
+                  <a:pt x="1277257" y="20754"/>
                 </a:cubicBezTo>
                 <a:cubicBezTo>
-                  <a:pt x="1701800" y="106644"/>
-                  <a:pt x="1062183" y="1041825"/>
-                  <a:pt x="1399310" y="1219625"/>
+                  <a:pt x="1516743" y="127192"/>
+                  <a:pt x="1061962" y="1080297"/>
+                  <a:pt x="1436914" y="1196411"/>
                 </a:cubicBezTo>
                 <a:cubicBezTo>
-                  <a:pt x="1736437" y="1397425"/>
-                  <a:pt x="3045692" y="986407"/>
-                  <a:pt x="3491346" y="1081080"/>
+                  <a:pt x="1811866" y="1312525"/>
+                  <a:pt x="2989943" y="811783"/>
+                  <a:pt x="3526971" y="717440"/>
                 </a:cubicBezTo>
                 <a:cubicBezTo>
-                  <a:pt x="3937000" y="1175753"/>
-                  <a:pt x="3807692" y="1621408"/>
-                  <a:pt x="4073237" y="1787662"/>
+                  <a:pt x="4063999" y="623097"/>
+                  <a:pt x="4385733" y="506983"/>
+                  <a:pt x="4659085" y="630354"/>
                 </a:cubicBezTo>
                 <a:cubicBezTo>
-                  <a:pt x="4338782" y="1953916"/>
-                  <a:pt x="4802910" y="2002407"/>
-                  <a:pt x="5084619" y="2078607"/>
-                </a:cubicBezTo>
-                <a:cubicBezTo>
-                  <a:pt x="5366328" y="2154807"/>
-                  <a:pt x="5631873" y="2154807"/>
-                  <a:pt x="5763491" y="2244862"/>
-                </a:cubicBezTo>
-                <a:cubicBezTo>
-                  <a:pt x="5895109" y="2334917"/>
-                  <a:pt x="5832764" y="2605080"/>
-                  <a:pt x="5874328" y="2618934"/>
+                  <a:pt x="4932437" y="753725"/>
+                  <a:pt x="5049761" y="1105697"/>
+                  <a:pt x="5167085" y="1457669"/>
                 </a:cubicBezTo>
               </a:path>
             </a:pathLst>
@@ -9263,7 +9209,7 @@
         </p:nvSpPr>
         <p:spPr>
           <a:xfrm>
-            <a:off x="3927121" y="4043860"/>
+            <a:off x="3376029" y="4244586"/>
             <a:ext cx="243027" cy="270725"/>
           </a:xfrm>
           <a:prstGeom prst="ellipse">
@@ -9293,57 +9239,9 @@
           </a:p>
         </p:txBody>
       </p:sp>
-      <p:sp>
-        <p:nvSpPr>
-          <p:cNvPr id="15" name="Arc 14"/>
-          <p:cNvSpPr/>
-          <p:nvPr/>
-        </p:nvSpPr>
-        <p:spPr>
-          <a:xfrm rot="2828682">
-            <a:off x="1502597" y="3987302"/>
-            <a:ext cx="2851743" cy="2144449"/>
-          </a:xfrm>
-          <a:prstGeom prst="arc">
-            <a:avLst>
-              <a:gd name="adj1" fmla="val 19589768"/>
-              <a:gd name="adj2" fmla="val 110909"/>
-            </a:avLst>
-          </a:prstGeom>
-          <a:ln w="47625">
-            <a:solidFill>
-              <a:srgbClr val="FF0000"/>
-            </a:solidFill>
-            <a:headEnd type="stealth"/>
-            <a:tailEnd type="none"/>
-          </a:ln>
-        </p:spPr>
-        <p:style>
-          <a:lnRef idx="1">
-            <a:schemeClr val="accent1"/>
-          </a:lnRef>
-          <a:fillRef idx="0">
-            <a:schemeClr val="accent1"/>
-          </a:fillRef>
-          <a:effectRef idx="0">
-            <a:schemeClr val="accent1"/>
-          </a:effectRef>
-          <a:fontRef idx="minor">
-            <a:schemeClr val="tx1"/>
-          </a:fontRef>
-        </p:style>
-        <p:txBody>
-          <a:bodyPr rtlCol="0" anchor="ctr"/>
-          <a:lstStyle/>
-          <a:p>
-            <a:pPr algn="ctr"/>
-            <a:endParaRPr lang="nl-NL"/>
-          </a:p>
-        </p:txBody>
-      </p:sp>
       <p:pic>
         <p:nvPicPr>
-          <p:cNvPr id="22" name="Picture 21"/>
+          <p:cNvPr id="17" name="Picture 16"/>
           <p:cNvPicPr>
             <a:picLocks noChangeAspect="1"/>
           </p:cNvPicPr>
@@ -9367,8 +9265,8 @@
         </p:blipFill>
         <p:spPr>
           <a:xfrm>
-            <a:off x="1259632" y="5773891"/>
-            <a:ext cx="2581598" cy="876171"/>
+            <a:off x="451493" y="3914993"/>
+            <a:ext cx="1744243" cy="1271806"/>
           </a:xfrm>
           <a:prstGeom prst="rect">
             <a:avLst/>
@@ -9380,56 +9278,9 @@
           </a:solidFill>
         </p:spPr>
       </p:pic>
-      <p:sp>
-        <p:nvSpPr>
-          <p:cNvPr id="27" name="Parallelogram 26"/>
-          <p:cNvSpPr/>
-          <p:nvPr/>
-        </p:nvSpPr>
-        <p:spPr>
-          <a:xfrm rot="20002988">
-            <a:off x="3312131" y="3449514"/>
-            <a:ext cx="1558667" cy="1811429"/>
-          </a:xfrm>
-          <a:prstGeom prst="parallelogram">
-            <a:avLst>
-              <a:gd name="adj" fmla="val 11691"/>
-            </a:avLst>
-          </a:prstGeom>
-          <a:solidFill>
-            <a:schemeClr val="accent6">
-              <a:lumMod val="60000"/>
-              <a:lumOff val="40000"/>
-              <a:alpha val="25000"/>
-            </a:schemeClr>
-          </a:solidFill>
-        </p:spPr>
-        <p:style>
-          <a:lnRef idx="2">
-            <a:schemeClr val="accent5"/>
-          </a:lnRef>
-          <a:fillRef idx="1">
-            <a:schemeClr val="lt1"/>
-          </a:fillRef>
-          <a:effectRef idx="0">
-            <a:schemeClr val="accent5"/>
-          </a:effectRef>
-          <a:fontRef idx="minor">
-            <a:schemeClr val="dk1"/>
-          </a:fontRef>
-        </p:style>
-        <p:txBody>
-          <a:bodyPr rtlCol="0" anchor="ctr"/>
-          <a:lstStyle/>
-          <a:p>
-            <a:pPr algn="ctr"/>
-            <a:endParaRPr lang="nl-NL"/>
-          </a:p>
-        </p:txBody>
-      </p:sp>
       <p:pic>
         <p:nvPicPr>
-          <p:cNvPr id="23" name="Picture 22"/>
+          <p:cNvPr id="9" name="Picture 8"/>
           <p:cNvPicPr>
             <a:picLocks noChangeAspect="1"/>
           </p:cNvPicPr>
@@ -9453,8 +9304,8 @@
         </p:blipFill>
         <p:spPr>
           <a:xfrm>
-            <a:off x="6106960" y="266622"/>
-            <a:ext cx="2862031" cy="890303"/>
+            <a:off x="2400488" y="5373216"/>
+            <a:ext cx="2439369" cy="879704"/>
           </a:xfrm>
           <a:prstGeom prst="rect">
             <a:avLst/>
@@ -9466,6 +9317,92 @@
           </a:solidFill>
         </p:spPr>
       </p:pic>
+      <p:sp>
+        <p:nvSpPr>
+          <p:cNvPr id="27" name="Parallelogram 26"/>
+          <p:cNvSpPr/>
+          <p:nvPr/>
+        </p:nvSpPr>
+        <p:spPr>
+          <a:xfrm rot="20731870">
+            <a:off x="2657451" y="3534390"/>
+            <a:ext cx="1558667" cy="1811429"/>
+          </a:xfrm>
+          <a:prstGeom prst="parallelogram">
+            <a:avLst>
+              <a:gd name="adj" fmla="val 11691"/>
+            </a:avLst>
+          </a:prstGeom>
+          <a:solidFill>
+            <a:schemeClr val="accent6">
+              <a:lumMod val="60000"/>
+              <a:lumOff val="40000"/>
+              <a:alpha val="25000"/>
+            </a:schemeClr>
+          </a:solidFill>
+        </p:spPr>
+        <p:style>
+          <a:lnRef idx="2">
+            <a:schemeClr val="accent5"/>
+          </a:lnRef>
+          <a:fillRef idx="1">
+            <a:schemeClr val="lt1"/>
+          </a:fillRef>
+          <a:effectRef idx="0">
+            <a:schemeClr val="accent5"/>
+          </a:effectRef>
+          <a:fontRef idx="minor">
+            <a:schemeClr val="dk1"/>
+          </a:fontRef>
+        </p:style>
+        <p:txBody>
+          <a:bodyPr rtlCol="0" anchor="ctr"/>
+          <a:lstStyle/>
+          <a:p>
+            <a:pPr algn="ctr"/>
+            <a:endParaRPr lang="nl-NL"/>
+          </a:p>
+        </p:txBody>
+      </p:sp>
+      <p:pic>
+        <p:nvPicPr>
+          <p:cNvPr id="8" name="Picture 7"/>
+          <p:cNvPicPr>
+            <a:picLocks noChangeAspect="1"/>
+          </p:cNvPicPr>
+          <p:nvPr>
+            <p:custDataLst>
+              <p:tags r:id="rId8"/>
+            </p:custDataLst>
+          </p:nvPr>
+        </p:nvPicPr>
+        <p:blipFill>
+          <a:blip r:embed="rId17">
+            <a:extLst>
+              <a:ext uri="{28A0092B-C50C-407E-A947-70E740481C1C}">
+                <a14:useLocalDpi xmlns:a14="http://schemas.microsoft.com/office/drawing/2010/main" val="0"/>
+              </a:ext>
+            </a:extLst>
+          </a:blip>
+          <a:stretch>
+            <a:fillRect/>
+          </a:stretch>
+        </p:blipFill>
+        <p:spPr>
+          <a:xfrm>
+            <a:off x="5803896" y="586690"/>
+            <a:ext cx="2440512" cy="879704"/>
+          </a:xfrm>
+          <a:prstGeom prst="rect">
+            <a:avLst/>
+          </a:prstGeom>
+          <a:solidFill>
+            <a:schemeClr val="bg1">
+              <a:alpha val="65000"/>
+            </a:schemeClr>
+          </a:solidFill>
+        </p:spPr>
+      </p:pic>
       <p:cxnSp>
         <p:nvCxnSpPr>
           <p:cNvPr id="6" name="Straight Arrow Connector 5"/>
@@ -9473,9 +9410,9 @@
           <p:nvPr/>
         </p:nvCxnSpPr>
         <p:spPr>
-          <a:xfrm>
-            <a:off x="4086153" y="4165095"/>
-            <a:ext cx="701871" cy="307039"/>
+          <a:xfrm flipH="1">
+            <a:off x="3376029" y="4424261"/>
+            <a:ext cx="121513" cy="777243"/>
           </a:xfrm>
           <a:prstGeom prst="straightConnector1">
             <a:avLst/>
@@ -9504,104 +9441,18 @@
       </p:cxnSp>
       <p:sp>
         <p:nvSpPr>
-          <p:cNvPr id="24" name="Arc 23"/>
-          <p:cNvSpPr/>
-          <p:nvPr/>
-        </p:nvSpPr>
-        <p:spPr>
-          <a:xfrm rot="20557147" flipH="1">
-            <a:off x="5840587" y="516014"/>
-            <a:ext cx="1207240" cy="1281823"/>
-          </a:xfrm>
-          <a:prstGeom prst="arc">
-            <a:avLst>
-              <a:gd name="adj1" fmla="val 16945032"/>
-              <a:gd name="adj2" fmla="val 21598597"/>
-            </a:avLst>
-          </a:prstGeom>
-          <a:ln w="47625">
-            <a:solidFill>
-              <a:srgbClr val="FF0000"/>
-            </a:solidFill>
-            <a:tailEnd type="stealth"/>
-          </a:ln>
-        </p:spPr>
-        <p:style>
-          <a:lnRef idx="1">
-            <a:schemeClr val="accent1"/>
-          </a:lnRef>
-          <a:fillRef idx="0">
-            <a:schemeClr val="accent1"/>
-          </a:fillRef>
-          <a:effectRef idx="0">
-            <a:schemeClr val="accent1"/>
-          </a:effectRef>
-          <a:fontRef idx="minor">
-            <a:schemeClr val="tx1"/>
-          </a:fontRef>
-        </p:style>
-        <p:txBody>
-          <a:bodyPr rtlCol="0" anchor="ctr"/>
-          <a:lstStyle/>
-          <a:p>
-            <a:pPr algn="ctr"/>
-            <a:endParaRPr lang="nl-NL"/>
-          </a:p>
-        </p:txBody>
-      </p:sp>
-      <p:pic>
-        <p:nvPicPr>
-          <p:cNvPr id="26" name="Picture 25"/>
-          <p:cNvPicPr>
-            <a:picLocks noChangeAspect="1"/>
-          </p:cNvPicPr>
-          <p:nvPr>
-            <p:custDataLst>
-              <p:tags r:id="rId8"/>
-            </p:custDataLst>
-          </p:nvPr>
-        </p:nvPicPr>
-        <p:blipFill>
-          <a:blip r:embed="rId18">
-            <a:extLst>
-              <a:ext uri="{28A0092B-C50C-407E-A947-70E740481C1C}">
-                <a14:useLocalDpi xmlns:a14="http://schemas.microsoft.com/office/drawing/2010/main" val="0"/>
-              </a:ext>
-            </a:extLst>
-          </a:blip>
-          <a:stretch>
-            <a:fillRect/>
-          </a:stretch>
-        </p:blipFill>
-        <p:spPr>
-          <a:xfrm>
-            <a:off x="5990575" y="3545600"/>
-            <a:ext cx="3079338" cy="1038586"/>
-          </a:xfrm>
-          <a:prstGeom prst="rect">
-            <a:avLst/>
-          </a:prstGeom>
-          <a:solidFill>
-            <a:schemeClr val="bg1">
-              <a:alpha val="65000"/>
-            </a:schemeClr>
-          </a:solidFill>
-        </p:spPr>
-      </p:pic>
-      <p:sp>
-        <p:nvSpPr>
           <p:cNvPr id="25" name="Arc 24"/>
           <p:cNvSpPr/>
           <p:nvPr/>
         </p:nvSpPr>
         <p:spPr>
-          <a:xfrm rot="3523298">
-            <a:off x="4701180" y="2299328"/>
-            <a:ext cx="1144022" cy="2216874"/>
+          <a:xfrm rot="2420895">
+            <a:off x="4051677" y="2417584"/>
+            <a:ext cx="849483" cy="2810915"/>
           </a:xfrm>
           <a:prstGeom prst="arc">
             <a:avLst>
-              <a:gd name="adj1" fmla="val 16916912"/>
+              <a:gd name="adj1" fmla="val 17017930"/>
               <a:gd name="adj2" fmla="val 3930637"/>
             </a:avLst>
           </a:prstGeom>
@@ -9643,7 +9494,7 @@
         </p:nvSpPr>
         <p:spPr>
           <a:xfrm rot="21180252" flipH="1">
-            <a:off x="5015714" y="1393004"/>
+            <a:off x="4979743" y="1357758"/>
             <a:ext cx="1547740" cy="1634383"/>
           </a:xfrm>
           <a:prstGeom prst="parallelogram">
@@ -9690,8 +9541,8 @@
         </p:nvCxnSpPr>
         <p:spPr>
           <a:xfrm>
-            <a:off x="5789584" y="2210195"/>
-            <a:ext cx="654624" cy="570733"/>
+            <a:off x="5789584" y="2132856"/>
+            <a:ext cx="654624" cy="376401"/>
           </a:xfrm>
           <a:prstGeom prst="straightConnector1">
             <a:avLst/>
@@ -34886,11 +34737,11 @@
 <file path=ppt/tags/tag34.xml><?xml version="1.0" encoding="utf-8"?>
 <p:tagLst xmlns:a="http://schemas.openxmlformats.org/drawingml/2006/main" xmlns:r="http://schemas.openxmlformats.org/officeDocument/2006/relationships" xmlns:p="http://schemas.openxmlformats.org/presentationml/2006/main">
   <p:tag name="OUTPUTDPI" val="1200"/>
-  <p:tag name="ORIGINALHEIGHT" val="104,25"/>
-  <p:tag name="ORIGINALWIDTH" val="140,25"/>
-  <p:tag name="LATEXADDIN" val="\documentclass{article}&#10;\usepackage{amsmath}&#10;\usepackage{amsfonts}&#10;\pagestyle{empty}&#10;\begin{document}&#10;&#10;$R_d$&#10;&#10;\end{document}"/>
+  <p:tag name="ORIGINALHEIGHT" val="56,25"/>
+  <p:tag name="ORIGINALWIDTH" val="51,75"/>
+  <p:tag name="LATEXADDIN" val="\documentclass{article}&#10;\usepackage{amsmath}&#10;\usepackage{amsfonts}&#10;\pagestyle{empty}&#10;\begin{document}&#10;&#10;$r$&#10;&#10;\end{document}"/>
   <p:tag name="IGUANATEXSIZE" val="20"/>
-  <p:tag name="IGUANATEXCURSOR" val="107"/>
+  <p:tag name="IGUANATEXCURSOR" val="105"/>
   <p:tag name="TRANSPARENCY" val="True"/>
   <p:tag name="FILENAME" val=""/>
   <p:tag name="LATEXENGINEID" val="0"/>
@@ -34924,9 +34775,9 @@
 <file path=ppt/tags/tag36.xml><?xml version="1.0" encoding="utf-8"?>
 <p:tagLst xmlns:a="http://schemas.openxmlformats.org/drawingml/2006/main" xmlns:r="http://schemas.openxmlformats.org/officeDocument/2006/relationships" xmlns:p="http://schemas.openxmlformats.org/presentationml/2006/main">
   <p:tag name="OUTPUTDPI" val="1200"/>
-  <p:tag name="ORIGINALHEIGHT" val="87,75"/>
-  <p:tag name="ORIGINALWIDTH" val="90"/>
-  <p:tag name="LATEXADDIN" val="\documentclass{article}&#10;\usepackage{amsmath}&#10;\usepackage{amsfonts}&#10;\pagestyle{empty}&#10;\begin{document}&#10;&#10;$R$&#10;&#10;\end{document}"/>
+  <p:tag name="ORIGINALHEIGHT" val="79,5"/>
+  <p:tag name="ORIGINALWIDTH" val="51,75"/>
+  <p:tag name="LATEXADDIN" val="\documentclass{article}&#10;\usepackage{amsmath}&#10;\usepackage{amsfonts}&#10;\pagestyle{empty}&#10;\begin{document}&#10;&#10;$q$&#10;&#10;\end{document}"/>
   <p:tag name="IGUANATEXSIZE" val="20"/>
   <p:tag name="IGUANATEXCURSOR" val="105"/>
   <p:tag name="TRANSPARENCY" val="True"/>
@@ -34941,6 +34792,25 @@
 </file>
 
 <file path=ppt/tags/tag37.xml><?xml version="1.0" encoding="utf-8"?>
+<p:tagLst xmlns:a="http://schemas.openxmlformats.org/drawingml/2006/main" xmlns:r="http://schemas.openxmlformats.org/officeDocument/2006/relationships" xmlns:p="http://schemas.openxmlformats.org/presentationml/2006/main">
+  <p:tag name="OUTPUTDPI" val="1200"/>
+  <p:tag name="ORIGINALHEIGHT" val="124,5"/>
+  <p:tag name="ORIGINALWIDTH" val="355,5"/>
+  <p:tag name="LATEXADDIN" val="\documentclass{article}&#10;\usepackage{amsmath}&#10;\usepackage{amsfonts}&#10;\pagestyle{empty}&#10;\begin{document}&#10;&#10;$\mathcal{T}(q,r)$&#10;&#10;\end{document}"/>
+  <p:tag name="IGUANATEXSIZE" val="20"/>
+  <p:tag name="IGUANATEXCURSOR" val="119"/>
+  <p:tag name="TRANSPARENCY" val="True"/>
+  <p:tag name="FILENAME" val=""/>
+  <p:tag name="LATEXENGINEID" val="0"/>
+  <p:tag name="TEMPFOLDER" val="c:\temp\"/>
+  <p:tag name="LATEXFORMHEIGHT" val="312"/>
+  <p:tag name="LATEXFORMWIDTH" val="384"/>
+  <p:tag name="LATEXFORMWRAP" val="True"/>
+  <p:tag name="BITMAPVECTOR" val="0"/>
+</p:tagLst>
+</file>
+
+<file path=ppt/tags/tag38.xml><?xml version="1.0" encoding="utf-8"?>
 <p:tagLst xmlns:a="http://schemas.openxmlformats.org/drawingml/2006/main" xmlns:r="http://schemas.openxmlformats.org/officeDocument/2006/relationships" xmlns:p="http://schemas.openxmlformats.org/presentationml/2006/main">
   <p:tag name="OUTPUTDPI" val="1200"/>
   <p:tag name="ORIGINALHEIGHT" val="124,5"/>
@@ -34959,7 +34829,7 @@
 </p:tagLst>
 </file>
 
-<file path=ppt/tags/tag38.xml><?xml version="1.0" encoding="utf-8"?>
+<file path=ppt/tags/tag39.xml><?xml version="1.0" encoding="utf-8"?>
 <p:tagLst xmlns:a="http://schemas.openxmlformats.org/drawingml/2006/main" xmlns:r="http://schemas.openxmlformats.org/officeDocument/2006/relationships" xmlns:p="http://schemas.openxmlformats.org/presentationml/2006/main">
   <p:tag name="OUTPUTDPI" val="1200"/>
   <p:tag name="ORIGINALHEIGHT" val="124,5"/>
@@ -34967,25 +34837,6 @@
   <p:tag name="LATEXADDIN" val="\documentclass{article}&#10;\usepackage{amsmath}&#10;\usepackage{amsfonts}&#10;\pagestyle{empty}&#10;\begin{document}&#10;&#10;$R(t)$&#10;&#10;\end{document}"/>
   <p:tag name="IGUANATEXSIZE" val="20"/>
   <p:tag name="IGUANATEXCURSOR" val="108"/>
-  <p:tag name="TRANSPARENCY" val="True"/>
-  <p:tag name="FILENAME" val=""/>
-  <p:tag name="LATEXENGINEID" val="0"/>
-  <p:tag name="TEMPFOLDER" val="c:\temp\"/>
-  <p:tag name="LATEXFORMHEIGHT" val="312"/>
-  <p:tag name="LATEXFORMWIDTH" val="384"/>
-  <p:tag name="LATEXFORMWRAP" val="True"/>
-  <p:tag name="BITMAPVECTOR" val="0"/>
-</p:tagLst>
-</file>
-
-<file path=ppt/tags/tag39.xml><?xml version="1.0" encoding="utf-8"?>
-<p:tagLst xmlns:a="http://schemas.openxmlformats.org/drawingml/2006/main" xmlns:r="http://schemas.openxmlformats.org/officeDocument/2006/relationships" xmlns:p="http://schemas.openxmlformats.org/presentationml/2006/main">
-  <p:tag name="OUTPUTDPI" val="1200"/>
-  <p:tag name="ORIGINALHEIGHT" val="124,5"/>
-  <p:tag name="ORIGINALWIDTH" val="481,5"/>
-  <p:tag name="LATEXADDIN" val="\documentclass{article}&#10;\usepackage{amsmath}&#10;\usepackage{amsfonts}&#10;\pagestyle{empty}&#10;\begin{document}&#10;&#10;$T_{R}SO(3)$&#10;&#10;\end{document}"/>
-  <p:tag name="IGUANATEXSIZE" val="20"/>
-  <p:tag name="IGUANATEXCURSOR" val="114"/>
   <p:tag name="TRANSPARENCY" val="True"/>
   <p:tag name="FILENAME" val=""/>
   <p:tag name="LATEXENGINEID" val="0"/>
@@ -35019,11 +34870,11 @@
 <file path=ppt/tags/tag40.xml><?xml version="1.0" encoding="utf-8"?>
 <p:tagLst xmlns:a="http://schemas.openxmlformats.org/drawingml/2006/main" xmlns:r="http://schemas.openxmlformats.org/officeDocument/2006/relationships" xmlns:p="http://schemas.openxmlformats.org/presentationml/2006/main">
   <p:tag name="OUTPUTDPI" val="1200"/>
-  <p:tag name="ORIGINALHEIGHT" val="126"/>
-  <p:tag name="ORIGINALWIDTH" val="533,25"/>
-  <p:tag name="LATEXADDIN" val="\documentclass{article}&#10;\usepackage{amsmath}&#10;\usepackage{amsfonts}&#10;\pagestyle{empty}&#10;\begin{document}&#10;&#10;$T_{R_d}SO(3)$&#10;&#10;\end{document}"/>
+  <p:tag name="ORIGINALHEIGHT" val="124,5"/>
+  <p:tag name="ORIGINALWIDTH" val="454,5"/>
+  <p:tag name="LATEXADDIN" val="\documentclass{article}&#10;\usepackage{amsmath}&#10;\usepackage{amsfonts}&#10;\pagestyle{empty}&#10;\begin{document}&#10;&#10;$T_{r}SO(3)$&#10;&#10;\end{document}"/>
   <p:tag name="IGUANATEXSIZE" val="20"/>
-  <p:tag name="IGUANATEXCURSOR" val="110"/>
+  <p:tag name="IGUANATEXCURSOR" val="108"/>
   <p:tag name="TRANSPARENCY" val="True"/>
   <p:tag name="FILENAME" val=""/>
   <p:tag name="LATEXENGINEID" val="0"/>
@@ -35039,10 +34890,10 @@
 <p:tagLst xmlns:a="http://schemas.openxmlformats.org/drawingml/2006/main" xmlns:r="http://schemas.openxmlformats.org/officeDocument/2006/relationships" xmlns:p="http://schemas.openxmlformats.org/presentationml/2006/main">
   <p:tag name="OUTPUTDPI" val="1200"/>
   <p:tag name="ORIGINALHEIGHT" val="124,5"/>
-  <p:tag name="ORIGINALWIDTH" val="483,75"/>
-  <p:tag name="LATEXADDIN" val="\documentclass{article}&#10;\usepackage{amsmath}&#10;\usepackage{amsfonts}&#10;\pagestyle{empty}&#10;\begin{document}&#10;&#10;$\mathcal{T}(R,R_d)$&#10;&#10;\end{document}"/>
+  <p:tag name="ORIGINALWIDTH" val="454,5"/>
+  <p:tag name="LATEXADDIN" val="\documentclass{article}&#10;\usepackage{amsmath}&#10;\usepackage{amsfonts}&#10;\pagestyle{empty}&#10;\begin{document}&#10;&#10;$T_{r}SO(3)$&#10;&#10;\end{document}"/>
   <p:tag name="IGUANATEXSIZE" val="20"/>
-  <p:tag name="IGUANATEXCURSOR" val="121"/>
+  <p:tag name="IGUANATEXCURSOR" val="108"/>
   <p:tag name="TRANSPARENCY" val="True"/>
   <p:tag name="FILENAME" val=""/>
   <p:tag name="LATEXENGINEID" val="0"/>

</xml_diff>

<commit_message>
edited results / appendix / procedure / trajectory
</commit_message>
<xml_diff>
--- a/StyleStuff/figures.pptx
+++ b/StyleStuff/figures.pptx
@@ -44,8 +44,9 @@
     <p:sldId id="275" r:id="rId38"/>
     <p:sldId id="297" r:id="rId39"/>
     <p:sldId id="266" r:id="rId40"/>
-    <p:sldId id="265" r:id="rId41"/>
-    <p:sldId id="296" r:id="rId42"/>
+    <p:sldId id="301" r:id="rId41"/>
+    <p:sldId id="265" r:id="rId42"/>
+    <p:sldId id="296" r:id="rId43"/>
   </p:sldIdLst>
   <p:sldSz cx="9144000" cy="6858000" type="screen4x3"/>
   <p:notesSz cx="6858000" cy="9144000"/>
@@ -328,7 +329,7 @@
           <a:p>
             <a:fld id="{54F4720F-D6E7-473E-8843-300157F93B80}" type="datetimeFigureOut">
               <a:rPr lang="nl-NL" smtClean="0"/>
-              <a:t>7-8-2017</a:t>
+              <a:t>9-8-2017</a:t>
             </a:fld>
             <a:endParaRPr lang="nl-NL"/>
           </a:p>
@@ -498,7 +499,7 @@
           <a:p>
             <a:fld id="{54F4720F-D6E7-473E-8843-300157F93B80}" type="datetimeFigureOut">
               <a:rPr lang="nl-NL" smtClean="0"/>
-              <a:t>7-8-2017</a:t>
+              <a:t>9-8-2017</a:t>
             </a:fld>
             <a:endParaRPr lang="nl-NL"/>
           </a:p>
@@ -678,7 +679,7 @@
           <a:p>
             <a:fld id="{54F4720F-D6E7-473E-8843-300157F93B80}" type="datetimeFigureOut">
               <a:rPr lang="nl-NL" smtClean="0"/>
-              <a:t>7-8-2017</a:t>
+              <a:t>9-8-2017</a:t>
             </a:fld>
             <a:endParaRPr lang="nl-NL"/>
           </a:p>
@@ -848,7 +849,7 @@
           <a:p>
             <a:fld id="{54F4720F-D6E7-473E-8843-300157F93B80}" type="datetimeFigureOut">
               <a:rPr lang="nl-NL" smtClean="0"/>
-              <a:t>7-8-2017</a:t>
+              <a:t>9-8-2017</a:t>
             </a:fld>
             <a:endParaRPr lang="nl-NL"/>
           </a:p>
@@ -1094,7 +1095,7 @@
           <a:p>
             <a:fld id="{54F4720F-D6E7-473E-8843-300157F93B80}" type="datetimeFigureOut">
               <a:rPr lang="nl-NL" smtClean="0"/>
-              <a:t>7-8-2017</a:t>
+              <a:t>9-8-2017</a:t>
             </a:fld>
             <a:endParaRPr lang="nl-NL"/>
           </a:p>
@@ -1382,7 +1383,7 @@
           <a:p>
             <a:fld id="{54F4720F-D6E7-473E-8843-300157F93B80}" type="datetimeFigureOut">
               <a:rPr lang="nl-NL" smtClean="0"/>
-              <a:t>7-8-2017</a:t>
+              <a:t>9-8-2017</a:t>
             </a:fld>
             <a:endParaRPr lang="nl-NL"/>
           </a:p>
@@ -1804,7 +1805,7 @@
           <a:p>
             <a:fld id="{54F4720F-D6E7-473E-8843-300157F93B80}" type="datetimeFigureOut">
               <a:rPr lang="nl-NL" smtClean="0"/>
-              <a:t>7-8-2017</a:t>
+              <a:t>9-8-2017</a:t>
             </a:fld>
             <a:endParaRPr lang="nl-NL"/>
           </a:p>
@@ -1922,7 +1923,7 @@
           <a:p>
             <a:fld id="{54F4720F-D6E7-473E-8843-300157F93B80}" type="datetimeFigureOut">
               <a:rPr lang="nl-NL" smtClean="0"/>
-              <a:t>7-8-2017</a:t>
+              <a:t>9-8-2017</a:t>
             </a:fld>
             <a:endParaRPr lang="nl-NL"/>
           </a:p>
@@ -2017,7 +2018,7 @@
           <a:p>
             <a:fld id="{54F4720F-D6E7-473E-8843-300157F93B80}" type="datetimeFigureOut">
               <a:rPr lang="nl-NL" smtClean="0"/>
-              <a:t>7-8-2017</a:t>
+              <a:t>9-8-2017</a:t>
             </a:fld>
             <a:endParaRPr lang="nl-NL"/>
           </a:p>
@@ -2294,7 +2295,7 @@
           <a:p>
             <a:fld id="{54F4720F-D6E7-473E-8843-300157F93B80}" type="datetimeFigureOut">
               <a:rPr lang="nl-NL" smtClean="0"/>
-              <a:t>7-8-2017</a:t>
+              <a:t>9-8-2017</a:t>
             </a:fld>
             <a:endParaRPr lang="nl-NL"/>
           </a:p>
@@ -2547,7 +2548,7 @@
           <a:p>
             <a:fld id="{54F4720F-D6E7-473E-8843-300157F93B80}" type="datetimeFigureOut">
               <a:rPr lang="nl-NL" smtClean="0"/>
-              <a:t>7-8-2017</a:t>
+              <a:t>9-8-2017</a:t>
             </a:fld>
             <a:endParaRPr lang="nl-NL"/>
           </a:p>
@@ -2760,7 +2761,7 @@
           <a:p>
             <a:fld id="{54F4720F-D6E7-473E-8843-300157F93B80}" type="datetimeFigureOut">
               <a:rPr lang="nl-NL" smtClean="0"/>
-              <a:t>7-8-2017</a:t>
+              <a:t>9-8-2017</a:t>
             </a:fld>
             <a:endParaRPr lang="nl-NL"/>
           </a:p>
@@ -16949,8 +16950,8 @@
             </a:fontRef>
           </p:style>
         </p:cxnSp>
-        <mc:AlternateContent xmlns:mc="http://schemas.openxmlformats.org/markup-compatibility/2006">
-          <mc:Choice xmlns:a14="http://schemas.microsoft.com/office/drawing/2010/main" Requires="a14">
+        <mc:AlternateContent xmlns:mc="http://schemas.openxmlformats.org/markup-compatibility/2006" xmlns:a14="http://schemas.microsoft.com/office/drawing/2010/main">
+          <mc:Choice Requires="a14">
             <p:sp>
               <p:nvSpPr>
                 <p:cNvPr id="12" name="TextBox 11"/>
@@ -17013,7 +17014,7 @@
               </p:txBody>
             </p:sp>
           </mc:Choice>
-          <mc:Fallback>
+          <mc:Fallback xmlns="">
             <p:sp>
               <p:nvSpPr>
                 <p:cNvPr id="12" name="TextBox 11"/>
@@ -17097,8 +17098,8 @@
             </a:p>
           </p:txBody>
         </p:sp>
-        <mc:AlternateContent xmlns:mc="http://schemas.openxmlformats.org/markup-compatibility/2006">
-          <mc:Choice xmlns:a14="http://schemas.microsoft.com/office/drawing/2010/main" Requires="a14">
+        <mc:AlternateContent xmlns:mc="http://schemas.openxmlformats.org/markup-compatibility/2006" xmlns:a14="http://schemas.microsoft.com/office/drawing/2010/main">
+          <mc:Choice Requires="a14">
             <p:sp>
               <p:nvSpPr>
                 <p:cNvPr id="14" name="TextBox 13"/>
@@ -17161,7 +17162,7 @@
               </p:txBody>
             </p:sp>
           </mc:Choice>
-          <mc:Fallback>
+          <mc:Fallback xmlns="">
             <p:sp>
               <p:nvSpPr>
                 <p:cNvPr id="14" name="TextBox 13"/>
@@ -17277,8 +17278,8 @@
           </a:p>
         </p:txBody>
       </p:sp>
-      <mc:AlternateContent xmlns:mc="http://schemas.openxmlformats.org/markup-compatibility/2006">
-        <mc:Choice xmlns:a14="http://schemas.microsoft.com/office/drawing/2010/main" Requires="a14">
+      <mc:AlternateContent xmlns:mc="http://schemas.openxmlformats.org/markup-compatibility/2006" xmlns:a14="http://schemas.microsoft.com/office/drawing/2010/main">
+        <mc:Choice Requires="a14">
           <p:sp>
             <p:nvSpPr>
               <p:cNvPr id="18" name="TextBox 17"/>
@@ -17341,7 +17342,7 @@
             </p:txBody>
           </p:sp>
         </mc:Choice>
-        <mc:Fallback>
+        <mc:Fallback xmlns="">
           <p:sp>
             <p:nvSpPr>
               <p:cNvPr id="18" name="TextBox 17"/>
@@ -17380,8 +17381,8 @@
           </p:sp>
         </mc:Fallback>
       </mc:AlternateContent>
-      <mc:AlternateContent xmlns:mc="http://schemas.openxmlformats.org/markup-compatibility/2006">
-        <mc:Choice xmlns:a14="http://schemas.microsoft.com/office/drawing/2010/main" Requires="a14">
+      <mc:AlternateContent xmlns:mc="http://schemas.openxmlformats.org/markup-compatibility/2006" xmlns:a14="http://schemas.microsoft.com/office/drawing/2010/main">
+        <mc:Choice Requires="a14">
           <p:sp>
             <p:nvSpPr>
               <p:cNvPr id="19" name="TextBox 18"/>
@@ -17444,7 +17445,7 @@
             </p:txBody>
           </p:sp>
         </mc:Choice>
-        <mc:Fallback>
+        <mc:Fallback xmlns="">
           <p:sp>
             <p:nvSpPr>
               <p:cNvPr id="19" name="TextBox 18"/>
@@ -17483,8 +17484,8 @@
           </p:sp>
         </mc:Fallback>
       </mc:AlternateContent>
-      <mc:AlternateContent xmlns:mc="http://schemas.openxmlformats.org/markup-compatibility/2006">
-        <mc:Choice xmlns:a14="http://schemas.microsoft.com/office/drawing/2010/main" Requires="a14">
+      <mc:AlternateContent xmlns:mc="http://schemas.openxmlformats.org/markup-compatibility/2006" xmlns:a14="http://schemas.microsoft.com/office/drawing/2010/main">
+        <mc:Choice Requires="a14">
           <p:sp>
             <p:nvSpPr>
               <p:cNvPr id="20" name="TextBox 19"/>
@@ -17547,7 +17548,7 @@
             </p:txBody>
           </p:sp>
         </mc:Choice>
-        <mc:Fallback>
+        <mc:Fallback xmlns="">
           <p:sp>
             <p:nvSpPr>
               <p:cNvPr id="20" name="TextBox 19"/>
@@ -18979,8 +18980,8 @@
           </a:fontRef>
         </p:style>
       </p:cxnSp>
-      <mc:AlternateContent xmlns:mc="http://schemas.openxmlformats.org/markup-compatibility/2006">
-        <mc:Choice xmlns:a14="http://schemas.microsoft.com/office/drawing/2010/main" Requires="a14">
+      <mc:AlternateContent xmlns:mc="http://schemas.openxmlformats.org/markup-compatibility/2006" xmlns:a14="http://schemas.microsoft.com/office/drawing/2010/main">
+        <mc:Choice Requires="a14">
           <p:sp>
             <p:nvSpPr>
               <p:cNvPr id="12" name="TextBox 11"/>
@@ -19030,7 +19031,7 @@
             </p:txBody>
           </p:sp>
         </mc:Choice>
-        <mc:Fallback>
+        <mc:Fallback xmlns="">
           <p:sp>
             <p:nvSpPr>
               <p:cNvPr id="12" name="TextBox 11"/>
@@ -19069,8 +19070,8 @@
           </p:sp>
         </mc:Fallback>
       </mc:AlternateContent>
-      <mc:AlternateContent xmlns:mc="http://schemas.openxmlformats.org/markup-compatibility/2006">
-        <mc:Choice xmlns:a14="http://schemas.microsoft.com/office/drawing/2010/main" Requires="a14">
+      <mc:AlternateContent xmlns:mc="http://schemas.openxmlformats.org/markup-compatibility/2006" xmlns:a14="http://schemas.microsoft.com/office/drawing/2010/main">
+        <mc:Choice Requires="a14">
           <p:sp>
             <p:nvSpPr>
               <p:cNvPr id="14" name="TextBox 13"/>
@@ -19114,7 +19115,7 @@
             </p:txBody>
           </p:sp>
         </mc:Choice>
-        <mc:Fallback>
+        <mc:Fallback xmlns="">
           <p:sp>
             <p:nvSpPr>
               <p:cNvPr id="14" name="TextBox 13"/>
@@ -19191,8 +19192,8 @@
           </a:p>
         </p:txBody>
       </p:sp>
-      <mc:AlternateContent xmlns:mc="http://schemas.openxmlformats.org/markup-compatibility/2006">
-        <mc:Choice xmlns:a14="http://schemas.microsoft.com/office/drawing/2010/main" Requires="a14">
+      <mc:AlternateContent xmlns:mc="http://schemas.openxmlformats.org/markup-compatibility/2006" xmlns:a14="http://schemas.microsoft.com/office/drawing/2010/main">
+        <mc:Choice Requires="a14">
           <p:sp>
             <p:nvSpPr>
               <p:cNvPr id="18" name="TextBox 17"/>
@@ -19255,7 +19256,7 @@
             </p:txBody>
           </p:sp>
         </mc:Choice>
-        <mc:Fallback>
+        <mc:Fallback xmlns="">
           <p:sp>
             <p:nvSpPr>
               <p:cNvPr id="18" name="TextBox 17"/>
@@ -19294,8 +19295,8 @@
           </p:sp>
         </mc:Fallback>
       </mc:AlternateContent>
-      <mc:AlternateContent xmlns:mc="http://schemas.openxmlformats.org/markup-compatibility/2006">
-        <mc:Choice xmlns:a14="http://schemas.microsoft.com/office/drawing/2010/main" Requires="a14">
+      <mc:AlternateContent xmlns:mc="http://schemas.openxmlformats.org/markup-compatibility/2006" xmlns:a14="http://schemas.microsoft.com/office/drawing/2010/main">
+        <mc:Choice Requires="a14">
           <p:sp>
             <p:nvSpPr>
               <p:cNvPr id="19" name="TextBox 18"/>
@@ -19358,7 +19359,7 @@
             </p:txBody>
           </p:sp>
         </mc:Choice>
-        <mc:Fallback>
+        <mc:Fallback xmlns="">
           <p:sp>
             <p:nvSpPr>
               <p:cNvPr id="19" name="TextBox 18"/>
@@ -19397,8 +19398,8 @@
           </p:sp>
         </mc:Fallback>
       </mc:AlternateContent>
-      <mc:AlternateContent xmlns:mc="http://schemas.openxmlformats.org/markup-compatibility/2006">
-        <mc:Choice xmlns:a14="http://schemas.microsoft.com/office/drawing/2010/main" Requires="a14">
+      <mc:AlternateContent xmlns:mc="http://schemas.openxmlformats.org/markup-compatibility/2006" xmlns:a14="http://schemas.microsoft.com/office/drawing/2010/main">
+        <mc:Choice Requires="a14">
           <p:sp>
             <p:nvSpPr>
               <p:cNvPr id="20" name="TextBox 19"/>
@@ -19461,7 +19462,7 @@
             </p:txBody>
           </p:sp>
         </mc:Choice>
-        <mc:Fallback>
+        <mc:Fallback xmlns="">
           <p:sp>
             <p:nvSpPr>
               <p:cNvPr id="20" name="TextBox 19"/>
@@ -19581,8 +19582,8 @@
           </a:p>
         </p:txBody>
       </p:sp>
-      <mc:AlternateContent xmlns:mc="http://schemas.openxmlformats.org/markup-compatibility/2006">
-        <mc:Choice xmlns:a14="http://schemas.microsoft.com/office/drawing/2010/main" Requires="a14">
+      <mc:AlternateContent xmlns:mc="http://schemas.openxmlformats.org/markup-compatibility/2006" xmlns:a14="http://schemas.microsoft.com/office/drawing/2010/main">
+        <mc:Choice Requires="a14">
           <p:sp>
             <p:nvSpPr>
               <p:cNvPr id="26" name="TextBox 25"/>
@@ -19626,7 +19627,7 @@
             </p:txBody>
           </p:sp>
         </mc:Choice>
-        <mc:Fallback>
+        <mc:Fallback xmlns="">
           <p:sp>
             <p:nvSpPr>
               <p:cNvPr id="26" name="TextBox 25"/>
@@ -33074,6 +33075,967 @@
           <a:chExt cx="0" cy="0"/>
         </a:xfrm>
       </p:grpSpPr>
+      <p:grpSp>
+        <p:nvGrpSpPr>
+          <p:cNvPr id="10" name="Group 9"/>
+          <p:cNvGrpSpPr/>
+          <p:nvPr/>
+        </p:nvGrpSpPr>
+        <p:grpSpPr>
+          <a:xfrm>
+            <a:off x="3563888" y="4861711"/>
+            <a:ext cx="5415254" cy="1951665"/>
+            <a:chOff x="3693250" y="4285647"/>
+            <a:chExt cx="5415254" cy="1951665"/>
+          </a:xfrm>
+        </p:grpSpPr>
+        <p:sp>
+          <p:nvSpPr>
+            <p:cNvPr id="2" name="TextBox 1"/>
+            <p:cNvSpPr txBox="1"/>
+            <p:nvPr/>
+          </p:nvSpPr>
+          <p:spPr>
+            <a:xfrm>
+              <a:off x="7336386" y="4641442"/>
+              <a:ext cx="1052038" cy="562504"/>
+            </a:xfrm>
+            <a:prstGeom prst="rect">
+              <a:avLst/>
+            </a:prstGeom>
+          </p:spPr>
+          <p:style>
+            <a:lnRef idx="2">
+              <a:schemeClr val="dk1"/>
+            </a:lnRef>
+            <a:fillRef idx="1">
+              <a:schemeClr val="lt1"/>
+            </a:fillRef>
+            <a:effectRef idx="0">
+              <a:schemeClr val="dk1"/>
+            </a:effectRef>
+            <a:fontRef idx="minor">
+              <a:schemeClr val="dk1"/>
+            </a:fontRef>
+          </p:style>
+          <p:txBody>
+            <a:bodyPr wrap="square" rtlCol="0">
+              <a:spAutoFit/>
+            </a:bodyPr>
+            <a:lstStyle/>
+            <a:p>
+              <a:r>
+                <a:rPr lang="nl-NL" sz="1600" dirty="0" smtClean="0"/>
+                <a:t>QR-Load </a:t>
+              </a:r>
+            </a:p>
+            <a:p>
+              <a:r>
+                <a:rPr lang="nl-NL" sz="1600" dirty="0" smtClean="0"/>
+                <a:t>Dynamics</a:t>
+              </a:r>
+            </a:p>
+          </p:txBody>
+        </p:sp>
+        <p:sp>
+          <p:nvSpPr>
+            <p:cNvPr id="3" name="TextBox 2"/>
+            <p:cNvSpPr txBox="1"/>
+            <p:nvPr/>
+          </p:nvSpPr>
+          <p:spPr>
+            <a:xfrm>
+              <a:off x="4354857" y="4641442"/>
+              <a:ext cx="1166563" cy="562504"/>
+            </a:xfrm>
+            <a:prstGeom prst="rect">
+              <a:avLst/>
+            </a:prstGeom>
+          </p:spPr>
+          <p:style>
+            <a:lnRef idx="2">
+              <a:schemeClr val="dk1"/>
+            </a:lnRef>
+            <a:fillRef idx="1">
+              <a:schemeClr val="lt1"/>
+            </a:fillRef>
+            <a:effectRef idx="0">
+              <a:schemeClr val="dk1"/>
+            </a:effectRef>
+            <a:fontRef idx="minor">
+              <a:schemeClr val="dk1"/>
+            </a:fontRef>
+          </p:style>
+          <p:txBody>
+            <a:bodyPr wrap="square" rtlCol="0">
+              <a:spAutoFit/>
+            </a:bodyPr>
+            <a:lstStyle/>
+            <a:p>
+              <a:r>
+                <a:rPr lang="nl-NL" sz="1600" dirty="0" smtClean="0"/>
+                <a:t>QR attitude controller</a:t>
+              </a:r>
+            </a:p>
+          </p:txBody>
+        </p:sp>
+        <p:grpSp>
+          <p:nvGrpSpPr>
+            <p:cNvPr id="9" name="Group 8"/>
+            <p:cNvGrpSpPr/>
+            <p:nvPr/>
+          </p:nvGrpSpPr>
+          <p:grpSpPr>
+            <a:xfrm>
+              <a:off x="5521420" y="4815197"/>
+              <a:ext cx="404950" cy="275060"/>
+              <a:chOff x="6216244" y="4509120"/>
+              <a:chExt cx="449932" cy="275059"/>
+            </a:xfrm>
+          </p:grpSpPr>
+          <p:cxnSp>
+            <p:nvCxnSpPr>
+              <p:cNvPr id="7" name="Straight Arrow Connector 6"/>
+              <p:cNvCxnSpPr/>
+              <p:nvPr/>
+            </p:nvCxnSpPr>
+            <p:spPr>
+              <a:xfrm>
+                <a:off x="6216244" y="4509120"/>
+                <a:ext cx="443988" cy="0"/>
+              </a:xfrm>
+              <a:prstGeom prst="straightConnector1">
+                <a:avLst/>
+              </a:prstGeom>
+              <a:ln>
+                <a:tailEnd type="arrow"/>
+              </a:ln>
+              <a:effectLst/>
+            </p:spPr>
+            <p:style>
+              <a:lnRef idx="3">
+                <a:schemeClr val="dk1"/>
+              </a:lnRef>
+              <a:fillRef idx="0">
+                <a:schemeClr val="dk1"/>
+              </a:fillRef>
+              <a:effectRef idx="2">
+                <a:schemeClr val="dk1"/>
+              </a:effectRef>
+              <a:fontRef idx="minor">
+                <a:schemeClr val="tx1"/>
+              </a:fontRef>
+            </p:style>
+          </p:cxnSp>
+          <p:cxnSp>
+            <p:nvCxnSpPr>
+              <p:cNvPr id="8" name="Straight Arrow Connector 7"/>
+              <p:cNvCxnSpPr/>
+              <p:nvPr/>
+            </p:nvCxnSpPr>
+            <p:spPr>
+              <a:xfrm>
+                <a:off x="6222188" y="4784179"/>
+                <a:ext cx="443988" cy="0"/>
+              </a:xfrm>
+              <a:prstGeom prst="straightConnector1">
+                <a:avLst/>
+              </a:prstGeom>
+              <a:ln>
+                <a:tailEnd type="arrow"/>
+              </a:ln>
+              <a:effectLst/>
+            </p:spPr>
+            <p:style>
+              <a:lnRef idx="3">
+                <a:schemeClr val="dk1"/>
+              </a:lnRef>
+              <a:fillRef idx="0">
+                <a:schemeClr val="dk1"/>
+              </a:fillRef>
+              <a:effectRef idx="2">
+                <a:schemeClr val="dk1"/>
+              </a:effectRef>
+              <a:fontRef idx="minor">
+                <a:schemeClr val="tx1"/>
+              </a:fontRef>
+            </p:style>
+          </p:cxnSp>
+        </p:grpSp>
+        <mc:AlternateContent xmlns:mc="http://schemas.openxmlformats.org/markup-compatibility/2006">
+          <mc:Choice xmlns:a14="http://schemas.microsoft.com/office/drawing/2010/main" Requires="a14">
+            <p:sp>
+              <p:nvSpPr>
+                <p:cNvPr id="21" name="TextBox 20"/>
+                <p:cNvSpPr txBox="1"/>
+                <p:nvPr/>
+              </p:nvSpPr>
+              <p:spPr>
+                <a:xfrm>
+                  <a:off x="3693250" y="5087326"/>
+                  <a:ext cx="901931" cy="523220"/>
+                </a:xfrm>
+                <a:prstGeom prst="rect">
+                  <a:avLst/>
+                </a:prstGeom>
+                <a:noFill/>
+              </p:spPr>
+              <p:txBody>
+                <a:bodyPr wrap="square" rtlCol="0">
+                  <a:spAutoFit/>
+                </a:bodyPr>
+                <a:lstStyle/>
+                <a:p>
+                  <a:pPr/>
+                  <a14:m>
+                    <m:oMathPara xmlns:m="http://schemas.openxmlformats.org/officeDocument/2006/math">
+                      <m:oMathParaPr>
+                        <m:jc m:val="centerGroup"/>
+                      </m:oMathParaPr>
+                      <m:oMath xmlns:m="http://schemas.openxmlformats.org/officeDocument/2006/math">
+                        <m:sSub>
+                          <m:sSubPr>
+                            <m:ctrlPr>
+                              <a:rPr lang="nl-NL" sz="2800" b="0" i="1" smtClean="0">
+                                <a:latin typeface="Cambria Math"/>
+                              </a:rPr>
+                            </m:ctrlPr>
+                          </m:sSubPr>
+                          <m:e>
+                            <m:r>
+                              <a:rPr lang="nl-NL" sz="2800" b="0" i="1" smtClean="0">
+                                <a:latin typeface="Cambria Math"/>
+                              </a:rPr>
+                              <m:t>𝑅</m:t>
+                            </m:r>
+                          </m:e>
+                          <m:sub>
+                            <m:r>
+                              <a:rPr lang="nl-NL" sz="2800" b="0" i="1" smtClean="0">
+                                <a:latin typeface="Cambria Math"/>
+                              </a:rPr>
+                              <m:t>𝑑</m:t>
+                            </m:r>
+                          </m:sub>
+                        </m:sSub>
+                      </m:oMath>
+                    </m:oMathPara>
+                  </a14:m>
+                  <a:endParaRPr lang="nl-NL" sz="2400" dirty="0"/>
+                </a:p>
+              </p:txBody>
+            </p:sp>
+          </mc:Choice>
+          <mc:Fallback>
+            <p:sp>
+              <p:nvSpPr>
+                <p:cNvPr id="21" name="TextBox 20"/>
+                <p:cNvSpPr txBox="1">
+                  <a:spLocks noRot="1" noChangeAspect="1" noMove="1" noResize="1" noEditPoints="1" noAdjustHandles="1" noChangeArrowheads="1" noChangeShapeType="1" noTextEdit="1"/>
+                </p:cNvSpPr>
+                <p:nvPr/>
+              </p:nvSpPr>
+              <p:spPr>
+                <a:xfrm>
+                  <a:off x="3693250" y="5087326"/>
+                  <a:ext cx="901931" cy="523220"/>
+                </a:xfrm>
+                <a:prstGeom prst="rect">
+                  <a:avLst/>
+                </a:prstGeom>
+                <a:blipFill rotWithShape="1">
+                  <a:blip r:embed="rId2"/>
+                  <a:stretch>
+                    <a:fillRect/>
+                  </a:stretch>
+                </a:blipFill>
+              </p:spPr>
+              <p:txBody>
+                <a:bodyPr/>
+                <a:lstStyle/>
+                <a:p>
+                  <a:r>
+                    <a:rPr lang="nl-NL">
+                      <a:noFill/>
+                    </a:rPr>
+                    <a:t> </a:t>
+                  </a:r>
+                </a:p>
+              </p:txBody>
+            </p:sp>
+          </mc:Fallback>
+        </mc:AlternateContent>
+        <mc:AlternateContent xmlns:mc="http://schemas.openxmlformats.org/markup-compatibility/2006" xmlns:a14="http://schemas.microsoft.com/office/drawing/2010/main">
+          <mc:Choice Requires="a14">
+            <p:sp>
+              <p:nvSpPr>
+                <p:cNvPr id="22" name="TextBox 21"/>
+                <p:cNvSpPr txBox="1"/>
+                <p:nvPr/>
+              </p:nvSpPr>
+              <p:spPr>
+                <a:xfrm>
+                  <a:off x="5275605" y="5116931"/>
+                  <a:ext cx="901931" cy="444083"/>
+                </a:xfrm>
+                <a:prstGeom prst="rect">
+                  <a:avLst/>
+                </a:prstGeom>
+                <a:noFill/>
+              </p:spPr>
+              <p:txBody>
+                <a:bodyPr wrap="square" rtlCol="0">
+                  <a:spAutoFit/>
+                </a:bodyPr>
+                <a:lstStyle/>
+                <a:p>
+                  <a:pPr/>
+                  <a14:m>
+                    <m:oMathPara xmlns:m="http://schemas.openxmlformats.org/officeDocument/2006/math">
+                      <m:oMathParaPr>
+                        <m:jc m:val="centerGroup"/>
+                      </m:oMathParaPr>
+                      <m:oMath xmlns:m="http://schemas.openxmlformats.org/officeDocument/2006/math">
+                        <m:r>
+                          <a:rPr lang="nl-NL" sz="2400" b="0" i="1" smtClean="0">
+                            <a:latin typeface="Cambria Math"/>
+                          </a:rPr>
+                          <m:t>𝑀</m:t>
+                        </m:r>
+                      </m:oMath>
+                    </m:oMathPara>
+                  </a14:m>
+                  <a:endParaRPr lang="nl-NL" sz="2400" dirty="0"/>
+                </a:p>
+              </p:txBody>
+            </p:sp>
+          </mc:Choice>
+          <mc:Fallback xmlns="">
+            <p:sp>
+              <p:nvSpPr>
+                <p:cNvPr id="22" name="TextBox 21"/>
+                <p:cNvSpPr txBox="1">
+                  <a:spLocks noRot="1" noChangeAspect="1" noMove="1" noResize="1" noEditPoints="1" noAdjustHandles="1" noChangeArrowheads="1" noChangeShapeType="1" noTextEdit="1"/>
+                </p:cNvSpPr>
+                <p:nvPr/>
+              </p:nvSpPr>
+              <p:spPr>
+                <a:xfrm>
+                  <a:off x="5275605" y="5116931"/>
+                  <a:ext cx="901931" cy="444083"/>
+                </a:xfrm>
+                <a:prstGeom prst="rect">
+                  <a:avLst/>
+                </a:prstGeom>
+                <a:blipFill rotWithShape="1">
+                  <a:blip r:embed="rId4"/>
+                  <a:stretch>
+                    <a:fillRect/>
+                  </a:stretch>
+                </a:blipFill>
+              </p:spPr>
+              <p:txBody>
+                <a:bodyPr/>
+                <a:lstStyle/>
+                <a:p>
+                  <a:r>
+                    <a:rPr lang="nl-NL">
+                      <a:noFill/>
+                    </a:rPr>
+                    <a:t> </a:t>
+                  </a:r>
+                </a:p>
+              </p:txBody>
+            </p:sp>
+          </mc:Fallback>
+        </mc:AlternateContent>
+        <p:cxnSp>
+          <p:nvCxnSpPr>
+            <p:cNvPr id="23" name="Straight Arrow Connector 22"/>
+            <p:cNvCxnSpPr>
+              <a:stCxn id="2" idx="3"/>
+            </p:cNvCxnSpPr>
+            <p:nvPr/>
+          </p:nvCxnSpPr>
+          <p:spPr>
+            <a:xfrm flipV="1">
+              <a:off x="8388424" y="4917194"/>
+              <a:ext cx="720080" cy="5499"/>
+            </a:xfrm>
+            <a:prstGeom prst="straightConnector1">
+              <a:avLst/>
+            </a:prstGeom>
+            <a:ln>
+              <a:tailEnd type="arrow"/>
+            </a:ln>
+            <a:effectLst/>
+          </p:spPr>
+          <p:style>
+            <a:lnRef idx="3">
+              <a:schemeClr val="dk1"/>
+            </a:lnRef>
+            <a:fillRef idx="0">
+              <a:schemeClr val="dk1"/>
+            </a:fillRef>
+            <a:effectRef idx="2">
+              <a:schemeClr val="dk1"/>
+            </a:effectRef>
+            <a:fontRef idx="minor">
+              <a:schemeClr val="tx1"/>
+            </a:fontRef>
+          </p:style>
+        </p:cxnSp>
+        <p:cxnSp>
+          <p:nvCxnSpPr>
+            <p:cNvPr id="28" name="Straight Connector 27"/>
+            <p:cNvCxnSpPr/>
+            <p:nvPr/>
+          </p:nvCxnSpPr>
+          <p:spPr>
+            <a:xfrm>
+              <a:off x="8460413" y="4917194"/>
+              <a:ext cx="0" cy="888644"/>
+            </a:xfrm>
+            <a:prstGeom prst="line">
+              <a:avLst/>
+            </a:prstGeom>
+            <a:effectLst/>
+          </p:spPr>
+          <p:style>
+            <a:lnRef idx="3">
+              <a:schemeClr val="dk1"/>
+            </a:lnRef>
+            <a:fillRef idx="0">
+              <a:schemeClr val="dk1"/>
+            </a:fillRef>
+            <a:effectRef idx="2">
+              <a:schemeClr val="dk1"/>
+            </a:effectRef>
+            <a:fontRef idx="minor">
+              <a:schemeClr val="tx1"/>
+            </a:fontRef>
+          </p:style>
+        </p:cxnSp>
+        <p:cxnSp>
+          <p:nvCxnSpPr>
+            <p:cNvPr id="37" name="Straight Connector 36"/>
+            <p:cNvCxnSpPr/>
+            <p:nvPr/>
+          </p:nvCxnSpPr>
+          <p:spPr>
+            <a:xfrm>
+              <a:off x="4938139" y="5805840"/>
+              <a:ext cx="3522274" cy="0"/>
+            </a:xfrm>
+            <a:prstGeom prst="line">
+              <a:avLst/>
+            </a:prstGeom>
+            <a:effectLst/>
+          </p:spPr>
+          <p:style>
+            <a:lnRef idx="3">
+              <a:schemeClr val="dk1"/>
+            </a:lnRef>
+            <a:fillRef idx="0">
+              <a:schemeClr val="dk1"/>
+            </a:fillRef>
+            <a:effectRef idx="2">
+              <a:schemeClr val="dk1"/>
+            </a:effectRef>
+            <a:fontRef idx="minor">
+              <a:schemeClr val="tx1"/>
+            </a:fontRef>
+          </p:style>
+        </p:cxnSp>
+        <p:cxnSp>
+          <p:nvCxnSpPr>
+            <p:cNvPr id="45" name="Straight Arrow Connector 44"/>
+            <p:cNvCxnSpPr/>
+            <p:nvPr/>
+          </p:nvCxnSpPr>
+          <p:spPr>
+            <a:xfrm flipV="1">
+              <a:off x="4938138" y="5231821"/>
+              <a:ext cx="1" cy="574018"/>
+            </a:xfrm>
+            <a:prstGeom prst="straightConnector1">
+              <a:avLst/>
+            </a:prstGeom>
+            <a:ln>
+              <a:tailEnd type="arrow"/>
+            </a:ln>
+            <a:effectLst/>
+          </p:spPr>
+          <p:style>
+            <a:lnRef idx="3">
+              <a:schemeClr val="dk1"/>
+            </a:lnRef>
+            <a:fillRef idx="0">
+              <a:schemeClr val="dk1"/>
+            </a:fillRef>
+            <a:effectRef idx="2">
+              <a:schemeClr val="dk1"/>
+            </a:effectRef>
+            <a:fontRef idx="minor">
+              <a:schemeClr val="tx1"/>
+            </a:fontRef>
+          </p:style>
+        </p:cxnSp>
+        <mc:AlternateContent xmlns:mc="http://schemas.openxmlformats.org/markup-compatibility/2006">
+          <mc:Choice xmlns:a14="http://schemas.microsoft.com/office/drawing/2010/main" Requires="a14">
+            <p:sp>
+              <p:nvSpPr>
+                <p:cNvPr id="55" name="TextBox 54"/>
+                <p:cNvSpPr txBox="1"/>
+                <p:nvPr/>
+              </p:nvSpPr>
+              <p:spPr>
+                <a:xfrm>
+                  <a:off x="5412200" y="5768127"/>
+                  <a:ext cx="2473443" cy="469185"/>
+                </a:xfrm>
+                <a:prstGeom prst="rect">
+                  <a:avLst/>
+                </a:prstGeom>
+                <a:noFill/>
+              </p:spPr>
+              <p:txBody>
+                <a:bodyPr wrap="square" rtlCol="0">
+                  <a:spAutoFit/>
+                </a:bodyPr>
+                <a:lstStyle/>
+                <a:p>
+                  <a:pPr/>
+                  <a14:m>
+                    <m:oMathPara xmlns:m="http://schemas.openxmlformats.org/officeDocument/2006/math">
+                      <m:oMathParaPr>
+                        <m:jc m:val="centerGroup"/>
+                      </m:oMathParaPr>
+                      <m:oMath xmlns:m="http://schemas.openxmlformats.org/officeDocument/2006/math">
+                        <m:sSub>
+                          <m:sSubPr>
+                            <m:ctrlPr>
+                              <a:rPr lang="nl-NL" sz="2400" b="0" i="1" smtClean="0">
+                                <a:latin typeface="Cambria Math"/>
+                              </a:rPr>
+                            </m:ctrlPr>
+                          </m:sSubPr>
+                          <m:e>
+                            <m:r>
+                              <a:rPr lang="nl-NL" sz="2400" b="0" i="1" smtClean="0">
+                                <a:latin typeface="Cambria Math"/>
+                              </a:rPr>
+                              <m:t>𝑥</m:t>
+                            </m:r>
+                          </m:e>
+                          <m:sub>
+                            <m:r>
+                              <a:rPr lang="nl-NL" sz="2400" b="0" i="1" smtClean="0">
+                                <a:latin typeface="Cambria Math"/>
+                              </a:rPr>
+                              <m:t>𝑄</m:t>
+                            </m:r>
+                          </m:sub>
+                        </m:sSub>
+                        <m:r>
+                          <a:rPr lang="nl-NL" sz="2400" b="0" i="1" smtClean="0">
+                            <a:latin typeface="Cambria Math"/>
+                          </a:rPr>
+                          <m:t>, </m:t>
+                        </m:r>
+                        <m:sSub>
+                          <m:sSubPr>
+                            <m:ctrlPr>
+                              <a:rPr lang="nl-NL" sz="2400" b="0" i="1" smtClean="0">
+                                <a:latin typeface="Cambria Math"/>
+                              </a:rPr>
+                            </m:ctrlPr>
+                          </m:sSubPr>
+                          <m:e>
+                            <m:r>
+                              <a:rPr lang="nl-NL" sz="2400" b="0" i="1" smtClean="0">
+                                <a:latin typeface="Cambria Math"/>
+                              </a:rPr>
+                              <m:t>𝑣</m:t>
+                            </m:r>
+                          </m:e>
+                          <m:sub>
+                            <m:r>
+                              <a:rPr lang="nl-NL" sz="2400" b="0" i="1" smtClean="0">
+                                <a:latin typeface="Cambria Math"/>
+                              </a:rPr>
+                              <m:t>𝑄</m:t>
+                            </m:r>
+                          </m:sub>
+                        </m:sSub>
+                        <m:r>
+                          <a:rPr lang="nl-NL" sz="2400" b="0" i="1" smtClean="0">
+                            <a:latin typeface="Cambria Math"/>
+                          </a:rPr>
+                          <m:t>, </m:t>
+                        </m:r>
+                        <m:sSub>
+                          <m:sSubPr>
+                            <m:ctrlPr>
+                              <a:rPr lang="nl-NL" sz="2400" b="0" i="1" smtClean="0">
+                                <a:latin typeface="Cambria Math"/>
+                              </a:rPr>
+                            </m:ctrlPr>
+                          </m:sSubPr>
+                          <m:e>
+                            <m:r>
+                              <a:rPr lang="nl-NL" sz="2400" b="0" i="1" smtClean="0">
+                                <a:latin typeface="Cambria Math"/>
+                              </a:rPr>
+                              <m:t>𝑥</m:t>
+                            </m:r>
+                          </m:e>
+                          <m:sub>
+                            <m:r>
+                              <a:rPr lang="nl-NL" sz="2400" b="0" i="1" smtClean="0">
+                                <a:latin typeface="Cambria Math"/>
+                              </a:rPr>
+                              <m:t>𝐿</m:t>
+                            </m:r>
+                          </m:sub>
+                        </m:sSub>
+                        <m:r>
+                          <a:rPr lang="nl-NL" sz="2400" b="0" i="1" smtClean="0">
+                            <a:latin typeface="Cambria Math"/>
+                          </a:rPr>
+                          <m:t>, </m:t>
+                        </m:r>
+                        <m:sSub>
+                          <m:sSubPr>
+                            <m:ctrlPr>
+                              <a:rPr lang="nl-NL" sz="2400" b="0" i="1" smtClean="0">
+                                <a:latin typeface="Cambria Math"/>
+                              </a:rPr>
+                            </m:ctrlPr>
+                          </m:sSubPr>
+                          <m:e>
+                            <m:r>
+                              <a:rPr lang="nl-NL" sz="2400" b="0" i="1" smtClean="0">
+                                <a:latin typeface="Cambria Math"/>
+                              </a:rPr>
+                              <m:t>𝑣</m:t>
+                            </m:r>
+                          </m:e>
+                          <m:sub>
+                            <m:r>
+                              <a:rPr lang="nl-NL" sz="2400" b="0" i="1" smtClean="0">
+                                <a:latin typeface="Cambria Math"/>
+                              </a:rPr>
+                              <m:t>𝐿</m:t>
+                            </m:r>
+                          </m:sub>
+                        </m:sSub>
+                        <m:r>
+                          <a:rPr lang="nl-NL" sz="2400" b="0" i="1" smtClean="0">
+                            <a:latin typeface="Cambria Math"/>
+                          </a:rPr>
+                          <m:t>, </m:t>
+                        </m:r>
+                        <m:r>
+                          <a:rPr lang="nl-NL" sz="2400" b="0" i="1" smtClean="0">
+                            <a:latin typeface="Cambria Math"/>
+                          </a:rPr>
+                          <m:t>𝑞</m:t>
+                        </m:r>
+                        <m:r>
+                          <a:rPr lang="nl-NL" sz="2400" b="0" i="1" smtClean="0">
+                            <a:latin typeface="Cambria Math"/>
+                          </a:rPr>
+                          <m:t>, </m:t>
+                        </m:r>
+                        <m:r>
+                          <a:rPr lang="nl-NL" sz="2400" b="0" i="1" smtClean="0">
+                            <a:latin typeface="Cambria Math"/>
+                          </a:rPr>
+                          <m:t>𝑅</m:t>
+                        </m:r>
+                      </m:oMath>
+                    </m:oMathPara>
+                  </a14:m>
+                  <a:endParaRPr lang="nl-NL" sz="2400" dirty="0"/>
+                </a:p>
+              </p:txBody>
+            </p:sp>
+          </mc:Choice>
+          <mc:Fallback>
+            <p:sp>
+              <p:nvSpPr>
+                <p:cNvPr id="55" name="TextBox 54"/>
+                <p:cNvSpPr txBox="1">
+                  <a:spLocks noRot="1" noChangeAspect="1" noMove="1" noResize="1" noEditPoints="1" noAdjustHandles="1" noChangeArrowheads="1" noChangeShapeType="1" noTextEdit="1"/>
+                </p:cNvSpPr>
+                <p:nvPr/>
+              </p:nvSpPr>
+              <p:spPr>
+                <a:xfrm>
+                  <a:off x="5412200" y="5768127"/>
+                  <a:ext cx="2473443" cy="469185"/>
+                </a:xfrm>
+                <a:prstGeom prst="rect">
+                  <a:avLst/>
+                </a:prstGeom>
+                <a:blipFill rotWithShape="1">
+                  <a:blip r:embed="rId5"/>
+                  <a:stretch>
+                    <a:fillRect b="-12987"/>
+                  </a:stretch>
+                </a:blipFill>
+              </p:spPr>
+              <p:txBody>
+                <a:bodyPr/>
+                <a:lstStyle/>
+                <a:p>
+                  <a:r>
+                    <a:rPr lang="nl-NL">
+                      <a:noFill/>
+                    </a:rPr>
+                    <a:t> </a:t>
+                  </a:r>
+                </a:p>
+              </p:txBody>
+            </p:sp>
+          </mc:Fallback>
+        </mc:AlternateContent>
+        <mc:AlternateContent xmlns:mc="http://schemas.openxmlformats.org/markup-compatibility/2006" xmlns:a14="http://schemas.microsoft.com/office/drawing/2010/main">
+          <mc:Choice Requires="a14">
+            <p:sp>
+              <p:nvSpPr>
+                <p:cNvPr id="78" name="TextBox 77"/>
+                <p:cNvSpPr txBox="1"/>
+                <p:nvPr/>
+              </p:nvSpPr>
+              <p:spPr>
+                <a:xfrm>
+                  <a:off x="5275605" y="4285647"/>
+                  <a:ext cx="901931" cy="444083"/>
+                </a:xfrm>
+                <a:prstGeom prst="rect">
+                  <a:avLst/>
+                </a:prstGeom>
+                <a:noFill/>
+              </p:spPr>
+              <p:txBody>
+                <a:bodyPr wrap="square" rtlCol="0">
+                  <a:spAutoFit/>
+                </a:bodyPr>
+                <a:lstStyle/>
+                <a:p>
+                  <a:pPr/>
+                  <a14:m>
+                    <m:oMathPara xmlns:m="http://schemas.openxmlformats.org/officeDocument/2006/math">
+                      <m:oMathParaPr>
+                        <m:jc m:val="centerGroup"/>
+                      </m:oMathParaPr>
+                      <m:oMath xmlns:m="http://schemas.openxmlformats.org/officeDocument/2006/math">
+                        <m:r>
+                          <a:rPr lang="nl-NL" sz="2400" b="0" i="1" smtClean="0">
+                            <a:latin typeface="Cambria Math"/>
+                          </a:rPr>
+                          <m:t>𝑓</m:t>
+                        </m:r>
+                      </m:oMath>
+                    </m:oMathPara>
+                  </a14:m>
+                  <a:endParaRPr lang="nl-NL" sz="2400" dirty="0"/>
+                </a:p>
+              </p:txBody>
+            </p:sp>
+          </mc:Choice>
+          <mc:Fallback xmlns="">
+            <p:sp>
+              <p:nvSpPr>
+                <p:cNvPr id="78" name="TextBox 77"/>
+                <p:cNvSpPr txBox="1">
+                  <a:spLocks noRot="1" noChangeAspect="1" noMove="1" noResize="1" noEditPoints="1" noAdjustHandles="1" noChangeArrowheads="1" noChangeShapeType="1" noTextEdit="1"/>
+                </p:cNvSpPr>
+                <p:nvPr/>
+              </p:nvSpPr>
+              <p:spPr>
+                <a:xfrm>
+                  <a:off x="5275605" y="4285647"/>
+                  <a:ext cx="901931" cy="444083"/>
+                </a:xfrm>
+                <a:prstGeom prst="rect">
+                  <a:avLst/>
+                </a:prstGeom>
+                <a:blipFill rotWithShape="1">
+                  <a:blip r:embed="rId9"/>
+                  <a:stretch>
+                    <a:fillRect b="-21918"/>
+                  </a:stretch>
+                </a:blipFill>
+              </p:spPr>
+              <p:txBody>
+                <a:bodyPr/>
+                <a:lstStyle/>
+                <a:p>
+                  <a:r>
+                    <a:rPr lang="nl-NL">
+                      <a:noFill/>
+                    </a:rPr>
+                    <a:t> </a:t>
+                  </a:r>
+                </a:p>
+              </p:txBody>
+            </p:sp>
+          </mc:Fallback>
+        </mc:AlternateContent>
+        <p:sp>
+          <p:nvSpPr>
+            <p:cNvPr id="42" name="TextBox 41"/>
+            <p:cNvSpPr txBox="1"/>
+            <p:nvPr/>
+          </p:nvSpPr>
+          <p:spPr>
+            <a:xfrm>
+              <a:off x="5926370" y="4641442"/>
+              <a:ext cx="1025647" cy="562504"/>
+            </a:xfrm>
+            <a:prstGeom prst="rect">
+              <a:avLst/>
+            </a:prstGeom>
+          </p:spPr>
+          <p:style>
+            <a:lnRef idx="2">
+              <a:schemeClr val="dk1"/>
+            </a:lnRef>
+            <a:fillRef idx="1">
+              <a:schemeClr val="lt1"/>
+            </a:fillRef>
+            <a:effectRef idx="0">
+              <a:schemeClr val="dk1"/>
+            </a:effectRef>
+            <a:fontRef idx="minor">
+              <a:schemeClr val="dk1"/>
+            </a:fontRef>
+          </p:style>
+          <p:txBody>
+            <a:bodyPr wrap="square" rtlCol="0">
+              <a:spAutoFit/>
+            </a:bodyPr>
+            <a:lstStyle/>
+            <a:p>
+              <a:r>
+                <a:rPr lang="nl-NL" sz="1600" dirty="0" smtClean="0"/>
+                <a:t>Rotor Controller</a:t>
+              </a:r>
+            </a:p>
+          </p:txBody>
+        </p:sp>
+        <p:cxnSp>
+          <p:nvCxnSpPr>
+            <p:cNvPr id="46" name="Straight Arrow Connector 45"/>
+            <p:cNvCxnSpPr>
+              <a:stCxn id="42" idx="3"/>
+              <a:endCxn id="2" idx="1"/>
+            </p:cNvCxnSpPr>
+            <p:nvPr/>
+          </p:nvCxnSpPr>
+          <p:spPr>
+            <a:xfrm>
+              <a:off x="6952017" y="4922695"/>
+              <a:ext cx="384369" cy="0"/>
+            </a:xfrm>
+            <a:prstGeom prst="straightConnector1">
+              <a:avLst/>
+            </a:prstGeom>
+            <a:ln>
+              <a:tailEnd type="arrow"/>
+            </a:ln>
+            <a:effectLst/>
+          </p:spPr>
+          <p:style>
+            <a:lnRef idx="3">
+              <a:schemeClr val="dk1"/>
+            </a:lnRef>
+            <a:fillRef idx="0">
+              <a:schemeClr val="dk1"/>
+            </a:fillRef>
+            <a:effectRef idx="2">
+              <a:schemeClr val="dk1"/>
+            </a:effectRef>
+            <a:fontRef idx="minor">
+              <a:schemeClr val="tx1"/>
+            </a:fontRef>
+          </p:style>
+        </p:cxnSp>
+        <p:cxnSp>
+          <p:nvCxnSpPr>
+            <p:cNvPr id="49" name="Straight Arrow Connector 48"/>
+            <p:cNvCxnSpPr/>
+            <p:nvPr/>
+          </p:nvCxnSpPr>
+          <p:spPr>
+            <a:xfrm>
+              <a:off x="3955258" y="4940307"/>
+              <a:ext cx="399600" cy="0"/>
+            </a:xfrm>
+            <a:prstGeom prst="straightConnector1">
+              <a:avLst/>
+            </a:prstGeom>
+            <a:ln>
+              <a:tailEnd type="arrow"/>
+            </a:ln>
+            <a:effectLst/>
+          </p:spPr>
+          <p:style>
+            <a:lnRef idx="3">
+              <a:schemeClr val="dk1"/>
+            </a:lnRef>
+            <a:fillRef idx="0">
+              <a:schemeClr val="dk1"/>
+            </a:fillRef>
+            <a:effectRef idx="2">
+              <a:schemeClr val="dk1"/>
+            </a:effectRef>
+            <a:fontRef idx="minor">
+              <a:schemeClr val="tx1"/>
+            </a:fontRef>
+          </p:style>
+        </p:cxnSp>
+      </p:grpSp>
+    </p:spTree>
+    <p:extLst>
+      <p:ext uri="{BB962C8B-B14F-4D97-AF65-F5344CB8AC3E}">
+        <p14:creationId xmlns:p14="http://schemas.microsoft.com/office/powerpoint/2010/main" val="186056995"/>
+      </p:ext>
+    </p:extLst>
+  </p:cSld>
+  <p:clrMapOvr>
+    <a:masterClrMapping/>
+  </p:clrMapOvr>
+  <p:timing>
+    <p:tnLst>
+      <p:par>
+        <p:cTn id="1" dur="indefinite" restart="never" nodeType="tmRoot"/>
+      </p:par>
+    </p:tnLst>
+  </p:timing>
+</p:sld>
+</file>
+
+<file path=ppt/slides/slide41.xml><?xml version="1.0" encoding="utf-8"?>
+<p:sld xmlns:a="http://schemas.openxmlformats.org/drawingml/2006/main" xmlns:r="http://schemas.openxmlformats.org/officeDocument/2006/relationships" xmlns:p="http://schemas.openxmlformats.org/presentationml/2006/main">
+  <p:cSld>
+    <p:spTree>
+      <p:nvGrpSpPr>
+        <p:cNvPr id="1" name=""/>
+        <p:cNvGrpSpPr/>
+        <p:nvPr/>
+      </p:nvGrpSpPr>
+      <p:grpSpPr>
+        <a:xfrm>
+          <a:off x="0" y="0"/>
+          <a:ext cx="0" cy="0"/>
+          <a:chOff x="0" y="0"/>
+          <a:chExt cx="0" cy="0"/>
+        </a:xfrm>
+      </p:grpSpPr>
       <p:cxnSp>
         <p:nvCxnSpPr>
           <p:cNvPr id="9" name="Straight Arrow Connector 8"/>
@@ -33142,8 +34104,8 @@
           </a:fontRef>
         </p:style>
       </p:cxnSp>
-      <mc:AlternateContent xmlns:mc="http://schemas.openxmlformats.org/markup-compatibility/2006">
-        <mc:Choice xmlns:a14="http://schemas.microsoft.com/office/drawing/2010/main" Requires="a14">
+      <mc:AlternateContent xmlns:mc="http://schemas.openxmlformats.org/markup-compatibility/2006" xmlns:a14="http://schemas.microsoft.com/office/drawing/2010/main">
+        <mc:Choice Requires="a14">
           <p:sp>
             <p:nvSpPr>
               <p:cNvPr id="13" name="TextBox 12"/>
@@ -33218,7 +34180,7 @@
             </p:txBody>
           </p:sp>
         </mc:Choice>
-        <mc:Fallback>
+        <mc:Fallback xmlns="">
           <p:sp>
             <p:nvSpPr>
               <p:cNvPr id="13" name="TextBox 12"/>
@@ -33257,8 +34219,8 @@
           </p:sp>
         </mc:Fallback>
       </mc:AlternateContent>
-      <mc:AlternateContent xmlns:mc="http://schemas.openxmlformats.org/markup-compatibility/2006">
-        <mc:Choice xmlns:a14="http://schemas.microsoft.com/office/drawing/2010/main" Requires="a14">
+      <mc:AlternateContent xmlns:mc="http://schemas.openxmlformats.org/markup-compatibility/2006" xmlns:a14="http://schemas.microsoft.com/office/drawing/2010/main">
+        <mc:Choice Requires="a14">
           <p:sp>
             <p:nvSpPr>
               <p:cNvPr id="14" name="TextBox 13"/>
@@ -33305,7 +34267,7 @@
                         <a:rPr lang="nl-NL" sz="2400" i="1">
                           <a:latin typeface="Cambria Math"/>
                         </a:rPr>
-                        <m:t>-</m:t>
+                        <m:t>−</m:t>
                       </m:r>
                       <m:r>
                         <a:rPr lang="nl-NL" sz="2400" b="0" i="1" smtClean="0">
@@ -33321,7 +34283,7 @@
             </p:txBody>
           </p:sp>
         </mc:Choice>
-        <mc:Fallback>
+        <mc:Fallback xmlns="">
           <p:sp>
             <p:nvSpPr>
               <p:cNvPr id="14" name="TextBox 13"/>
@@ -33500,8 +34462,8 @@
           </a:fontRef>
         </p:style>
       </p:cxnSp>
-      <mc:AlternateContent xmlns:mc="http://schemas.openxmlformats.org/markup-compatibility/2006">
-        <mc:Choice xmlns:a14="http://schemas.microsoft.com/office/drawing/2010/main" Requires="a14">
+      <mc:AlternateContent xmlns:mc="http://schemas.openxmlformats.org/markup-compatibility/2006" xmlns:a14="http://schemas.microsoft.com/office/drawing/2010/main">
+        <mc:Choice Requires="a14">
           <p:sp>
             <p:nvSpPr>
               <p:cNvPr id="32" name="TextBox 31"/>
@@ -33545,7 +34507,7 @@
             </p:txBody>
           </p:sp>
         </mc:Choice>
-        <mc:Fallback>
+        <mc:Fallback xmlns="">
           <p:sp>
             <p:nvSpPr>
               <p:cNvPr id="32" name="TextBox 31"/>
@@ -33736,8 +34698,8 @@
           </a:fontRef>
         </p:style>
       </p:cxnSp>
-      <mc:AlternateContent xmlns:mc="http://schemas.openxmlformats.org/markup-compatibility/2006">
-        <mc:Choice xmlns:a14="http://schemas.microsoft.com/office/drawing/2010/main" Requires="a14">
+      <mc:AlternateContent xmlns:mc="http://schemas.openxmlformats.org/markup-compatibility/2006" xmlns:a14="http://schemas.microsoft.com/office/drawing/2010/main">
+        <mc:Choice Requires="a14">
           <p:sp>
             <p:nvSpPr>
               <p:cNvPr id="30" name="TextBox 29"/>
@@ -33794,7 +34756,7 @@
             </p:txBody>
           </p:sp>
         </mc:Choice>
-        <mc:Fallback>
+        <mc:Fallback xmlns="">
           <p:sp>
             <p:nvSpPr>
               <p:cNvPr id="30" name="TextBox 29"/>
@@ -33947,8 +34909,8 @@
           </a:fontRef>
         </p:style>
       </p:cxnSp>
-      <mc:AlternateContent xmlns:mc="http://schemas.openxmlformats.org/markup-compatibility/2006">
-        <mc:Choice xmlns:a14="http://schemas.microsoft.com/office/drawing/2010/main" Requires="a14">
+      <mc:AlternateContent xmlns:mc="http://schemas.openxmlformats.org/markup-compatibility/2006" xmlns:a14="http://schemas.microsoft.com/office/drawing/2010/main">
+        <mc:Choice Requires="a14">
           <p:sp>
             <p:nvSpPr>
               <p:cNvPr id="35" name="TextBox 34"/>
@@ -33992,7 +34954,7 @@
             </p:txBody>
           </p:sp>
         </mc:Choice>
-        <mc:Fallback>
+        <mc:Fallback xmlns="">
           <p:sp>
             <p:nvSpPr>
               <p:cNvPr id="35" name="TextBox 34"/>
@@ -34215,8 +35177,8 @@
           </a:fontRef>
         </p:style>
       </p:cxnSp>
-      <mc:AlternateContent xmlns:mc="http://schemas.openxmlformats.org/markup-compatibility/2006">
-        <mc:Choice xmlns:a14="http://schemas.microsoft.com/office/drawing/2010/main" Requires="a14">
+      <mc:AlternateContent xmlns:mc="http://schemas.openxmlformats.org/markup-compatibility/2006" xmlns:a14="http://schemas.microsoft.com/office/drawing/2010/main">
+        <mc:Choice Requires="a14">
           <p:sp>
             <p:nvSpPr>
               <p:cNvPr id="45" name="TextBox 44"/>
@@ -34272,7 +35234,7 @@
             </p:txBody>
           </p:sp>
         </mc:Choice>
-        <mc:Fallback>
+        <mc:Fallback xmlns="">
           <p:sp>
             <p:nvSpPr>
               <p:cNvPr id="45" name="TextBox 44"/>
@@ -34311,8 +35273,8 @@
           </p:sp>
         </mc:Fallback>
       </mc:AlternateContent>
-      <mc:AlternateContent xmlns:mc="http://schemas.openxmlformats.org/markup-compatibility/2006">
-        <mc:Choice xmlns:a14="http://schemas.microsoft.com/office/drawing/2010/main" Requires="a14">
+      <mc:AlternateContent xmlns:mc="http://schemas.openxmlformats.org/markup-compatibility/2006" xmlns:a14="http://schemas.microsoft.com/office/drawing/2010/main">
+        <mc:Choice Requires="a14">
           <p:sp>
             <p:nvSpPr>
               <p:cNvPr id="46" name="TextBox 45"/>
@@ -34356,7 +35318,7 @@
             </p:txBody>
           </p:sp>
         </mc:Choice>
-        <mc:Fallback>
+        <mc:Fallback xmlns="">
           <p:sp>
             <p:nvSpPr>
               <p:cNvPr id="46" name="TextBox 45"/>
@@ -34417,7 +35379,6 @@
           </a:bodyPr>
           <a:lstStyle/>
           <a:p>
-            <a:pPr/>
             <a:r>
               <a:rPr lang="nl-NL" sz="2400" dirty="0" smtClean="0"/>
               <a:t>-</a:t>
@@ -34439,7 +35400,7 @@
 </p:sld>
 </file>
 
-<file path=ppt/slides/slide41.xml><?xml version="1.0" encoding="utf-8"?>
+<file path=ppt/slides/slide42.xml><?xml version="1.0" encoding="utf-8"?>
 <p:sld xmlns:a="http://schemas.openxmlformats.org/drawingml/2006/main" xmlns:r="http://schemas.openxmlformats.org/officeDocument/2006/relationships" xmlns:p="http://schemas.openxmlformats.org/presentationml/2006/main">
   <p:cSld>
     <p:spTree>

</xml_diff>